<commit_message>
Cut to 11 pages.
</commit_message>
<xml_diff>
--- a/figs_src/diagrams-wide-arial.pptx
+++ b/figs_src/diagrams-wide-arial.pptx
@@ -5,12 +5,13 @@
     <p:sldMasterId id="2147483648" r:id="rId1"/>
   </p:sldMasterIdLst>
   <p:notesMasterIdLst>
-    <p:notesMasterId r:id="rId5"/>
+    <p:notesMasterId r:id="rId6"/>
   </p:notesMasterIdLst>
   <p:sldIdLst>
     <p:sldId id="260" r:id="rId2"/>
-    <p:sldId id="266" r:id="rId3"/>
-    <p:sldId id="265" r:id="rId4"/>
+    <p:sldId id="267" r:id="rId3"/>
+    <p:sldId id="266" r:id="rId4"/>
+    <p:sldId id="265" r:id="rId5"/>
   </p:sldIdLst>
   <p:sldSz cx="6400800" cy="7772400"/>
   <p:notesSz cx="5943600" cy="7315200"/>
@@ -6141,14 +6142,14 @@
       </p:grpSpPr>
       <p:sp>
         <p:nvSpPr>
-          <p:cNvPr id="5" name="TextBox 4"/>
+          <p:cNvPr id="68" name="TextBox 67"/>
           <p:cNvSpPr txBox="1"/>
           <p:nvPr/>
         </p:nvSpPr>
         <p:spPr>
           <a:xfrm>
-            <a:off x="32529" y="164543"/>
-            <a:ext cx="1746885" cy="1384995"/>
+            <a:off x="4744151" y="22281"/>
+            <a:ext cx="615854" cy="215444"/>
           </a:xfrm>
           <a:prstGeom prst="rect">
             <a:avLst/>
@@ -6161,6 +6162,2883 @@
           </a:bodyPr>
           <a:lstStyle/>
           <a:p>
+            <a:pPr algn="ctr"/>
+            <a:r>
+              <a:rPr lang="en-US" sz="800" dirty="0" smtClean="0">
+                <a:latin typeface="Arial" pitchFamily="34" charset="0"/>
+                <a:cs typeface="Arial" pitchFamily="34" charset="0"/>
+              </a:rPr>
+              <a:t>flag 0</a:t>
+            </a:r>
+            <a:endParaRPr lang="en-US" sz="800" dirty="0">
+              <a:latin typeface="Arial" pitchFamily="34" charset="0"/>
+              <a:cs typeface="Arial" pitchFamily="34" charset="0"/>
+            </a:endParaRPr>
+          </a:p>
+        </p:txBody>
+      </p:sp>
+      <p:sp>
+        <p:nvSpPr>
+          <p:cNvPr id="87" name="TextBox 86"/>
+          <p:cNvSpPr txBox="1"/>
+          <p:nvPr/>
+        </p:nvSpPr>
+        <p:spPr>
+          <a:xfrm>
+            <a:off x="4744198" y="213904"/>
+            <a:ext cx="615854" cy="215444"/>
+          </a:xfrm>
+          <a:prstGeom prst="rect">
+            <a:avLst/>
+          </a:prstGeom>
+          <a:noFill/>
+        </p:spPr>
+        <p:txBody>
+          <a:bodyPr wrap="square" rtlCol="0">
+            <a:spAutoFit/>
+          </a:bodyPr>
+          <a:lstStyle/>
+          <a:p>
+            <a:pPr algn="ctr"/>
+            <a:r>
+              <a:rPr lang="en-US" sz="800" dirty="0" smtClean="0">
+                <a:latin typeface="Arial" pitchFamily="34" charset="0"/>
+                <a:cs typeface="Arial" pitchFamily="34" charset="0"/>
+              </a:rPr>
+              <a:t>flag 1</a:t>
+            </a:r>
+            <a:endParaRPr lang="en-US" sz="800" dirty="0">
+              <a:latin typeface="Arial" pitchFamily="34" charset="0"/>
+              <a:cs typeface="Arial" pitchFamily="34" charset="0"/>
+            </a:endParaRPr>
+          </a:p>
+        </p:txBody>
+      </p:sp>
+      <p:sp>
+        <p:nvSpPr>
+          <p:cNvPr id="92" name="Rectangle 91"/>
+          <p:cNvSpPr/>
+          <p:nvPr/>
+        </p:nvSpPr>
+        <p:spPr>
+          <a:xfrm>
+            <a:off x="1193780" y="427252"/>
+            <a:ext cx="1871585" cy="849014"/>
+          </a:xfrm>
+          <a:prstGeom prst="rect">
+            <a:avLst/>
+          </a:prstGeom>
+          <a:solidFill>
+            <a:schemeClr val="bg1">
+              <a:lumMod val="95000"/>
+            </a:schemeClr>
+          </a:solidFill>
+          <a:ln w="12700">
+            <a:solidFill>
+              <a:schemeClr val="tx1"/>
+            </a:solidFill>
+            <a:prstDash val="dash"/>
+          </a:ln>
+        </p:spPr>
+        <p:style>
+          <a:lnRef idx="2">
+            <a:schemeClr val="accent1">
+              <a:shade val="50000"/>
+            </a:schemeClr>
+          </a:lnRef>
+          <a:fillRef idx="1">
+            <a:schemeClr val="accent1"/>
+          </a:fillRef>
+          <a:effectRef idx="0">
+            <a:schemeClr val="accent1"/>
+          </a:effectRef>
+          <a:fontRef idx="minor">
+            <a:schemeClr val="lt1"/>
+          </a:fontRef>
+        </p:style>
+        <p:txBody>
+          <a:bodyPr rtlCol="0" anchor="ctr"/>
+          <a:lstStyle/>
+          <a:p>
+            <a:pPr algn="ctr"/>
+            <a:endParaRPr lang="en-US" sz="800" dirty="0" smtClean="0">
+              <a:solidFill>
+                <a:schemeClr val="tx1"/>
+              </a:solidFill>
+              <a:latin typeface="Arial" pitchFamily="34" charset="0"/>
+              <a:cs typeface="Arial" pitchFamily="34" charset="0"/>
+            </a:endParaRPr>
+          </a:p>
+        </p:txBody>
+      </p:sp>
+      <p:cxnSp>
+        <p:nvCxnSpPr>
+          <p:cNvPr id="64" name="Straight Arrow Connector 63"/>
+          <p:cNvCxnSpPr/>
+          <p:nvPr/>
+        </p:nvCxnSpPr>
+        <p:spPr>
+          <a:xfrm>
+            <a:off x="2966181" y="834075"/>
+            <a:ext cx="598450" cy="0"/>
+          </a:xfrm>
+          <a:prstGeom prst="straightConnector1">
+            <a:avLst/>
+          </a:prstGeom>
+          <a:ln w="19050">
+            <a:solidFill>
+              <a:schemeClr val="tx1"/>
+            </a:solidFill>
+            <a:headEnd w="sm" len="sm"/>
+            <a:tailEnd type="arrow" w="sm" len="sm"/>
+          </a:ln>
+        </p:spPr>
+        <p:style>
+          <a:lnRef idx="1">
+            <a:schemeClr val="accent1"/>
+          </a:lnRef>
+          <a:fillRef idx="0">
+            <a:schemeClr val="accent1"/>
+          </a:fillRef>
+          <a:effectRef idx="0">
+            <a:schemeClr val="accent1"/>
+          </a:effectRef>
+          <a:fontRef idx="minor">
+            <a:schemeClr val="tx1"/>
+          </a:fontRef>
+        </p:style>
+      </p:cxnSp>
+      <p:grpSp>
+        <p:nvGrpSpPr>
+          <p:cNvPr id="125" name="Group 124"/>
+          <p:cNvGrpSpPr/>
+          <p:nvPr/>
+        </p:nvGrpSpPr>
+        <p:grpSpPr>
+          <a:xfrm>
+            <a:off x="2462888" y="625360"/>
+            <a:ext cx="516229" cy="417431"/>
+            <a:chOff x="1569499" y="3233315"/>
+            <a:chExt cx="428024" cy="614235"/>
+          </a:xfrm>
+        </p:grpSpPr>
+        <p:sp>
+          <p:nvSpPr>
+            <p:cNvPr id="126" name="Trapezoid 125"/>
+            <p:cNvSpPr/>
+            <p:nvPr/>
+          </p:nvSpPr>
+          <p:spPr>
+            <a:xfrm rot="5400000">
+              <a:off x="1486175" y="3336203"/>
+              <a:ext cx="614235" cy="408460"/>
+            </a:xfrm>
+            <a:prstGeom prst="trapezoid">
+              <a:avLst>
+                <a:gd name="adj" fmla="val 25776"/>
+              </a:avLst>
+            </a:prstGeom>
+            <a:solidFill>
+              <a:srgbClr val="FFFFCC"/>
+            </a:solidFill>
+            <a:ln w="12700">
+              <a:solidFill>
+                <a:schemeClr val="tx1"/>
+              </a:solidFill>
+            </a:ln>
+          </p:spPr>
+          <p:style>
+            <a:lnRef idx="2">
+              <a:schemeClr val="accent1">
+                <a:shade val="50000"/>
+              </a:schemeClr>
+            </a:lnRef>
+            <a:fillRef idx="1">
+              <a:schemeClr val="accent1"/>
+            </a:fillRef>
+            <a:effectRef idx="0">
+              <a:schemeClr val="accent1"/>
+            </a:effectRef>
+            <a:fontRef idx="minor">
+              <a:schemeClr val="lt1"/>
+            </a:fontRef>
+          </p:style>
+          <p:txBody>
+            <a:bodyPr vert="vert270" rtlCol="0" anchor="ctr" anchorCtr="0"/>
+            <a:lstStyle/>
+            <a:p>
+              <a:pPr algn="ctr"/>
+              <a:endParaRPr lang="en-US" sz="800" dirty="0">
+                <a:solidFill>
+                  <a:sysClr val="windowText" lastClr="000000"/>
+                </a:solidFill>
+                <a:latin typeface="Arial" pitchFamily="34" charset="0"/>
+                <a:cs typeface="Arial" pitchFamily="34" charset="0"/>
+              </a:endParaRPr>
+            </a:p>
+          </p:txBody>
+        </p:sp>
+        <p:sp>
+          <p:nvSpPr>
+            <p:cNvPr id="127" name="Isosceles Triangle 126"/>
+            <p:cNvSpPr/>
+            <p:nvPr/>
+          </p:nvSpPr>
+          <p:spPr>
+            <a:xfrm rot="5400000">
+              <a:off x="1568302" y="3465547"/>
+              <a:ext cx="211562" cy="165279"/>
+            </a:xfrm>
+            <a:prstGeom prst="triangle">
+              <a:avLst/>
+            </a:prstGeom>
+            <a:solidFill>
+              <a:schemeClr val="bg1"/>
+            </a:solidFill>
+            <a:ln w="12700">
+              <a:solidFill>
+                <a:schemeClr val="tx1"/>
+              </a:solidFill>
+            </a:ln>
+          </p:spPr>
+          <p:style>
+            <a:lnRef idx="2">
+              <a:schemeClr val="accent1">
+                <a:shade val="50000"/>
+              </a:schemeClr>
+            </a:lnRef>
+            <a:fillRef idx="1">
+              <a:schemeClr val="accent1"/>
+            </a:fillRef>
+            <a:effectRef idx="0">
+              <a:schemeClr val="accent1"/>
+            </a:effectRef>
+            <a:fontRef idx="minor">
+              <a:schemeClr val="lt1"/>
+            </a:fontRef>
+          </p:style>
+          <p:txBody>
+            <a:bodyPr rtlCol="0" anchor="ctr"/>
+            <a:lstStyle/>
+            <a:p>
+              <a:pPr algn="ctr"/>
+              <a:endParaRPr lang="en-US" sz="800">
+                <a:latin typeface="Arial" pitchFamily="34" charset="0"/>
+                <a:cs typeface="Arial" pitchFamily="34" charset="0"/>
+              </a:endParaRPr>
+            </a:p>
+          </p:txBody>
+        </p:sp>
+        <p:sp>
+          <p:nvSpPr>
+            <p:cNvPr id="128" name="Isosceles Triangle 127"/>
+            <p:cNvSpPr/>
+            <p:nvPr/>
+          </p:nvSpPr>
+          <p:spPr>
+            <a:xfrm rot="5400000">
+              <a:off x="1545492" y="3466413"/>
+              <a:ext cx="211561" cy="163548"/>
+            </a:xfrm>
+            <a:prstGeom prst="triangle">
+              <a:avLst/>
+            </a:prstGeom>
+            <a:solidFill>
+              <a:schemeClr val="bg1">
+                <a:lumMod val="95000"/>
+              </a:schemeClr>
+            </a:solidFill>
+            <a:ln w="12700">
+              <a:solidFill>
+                <a:schemeClr val="bg1">
+                  <a:lumMod val="95000"/>
+                </a:schemeClr>
+              </a:solidFill>
+            </a:ln>
+          </p:spPr>
+          <p:style>
+            <a:lnRef idx="2">
+              <a:schemeClr val="accent1">
+                <a:shade val="50000"/>
+              </a:schemeClr>
+            </a:lnRef>
+            <a:fillRef idx="1">
+              <a:schemeClr val="accent1"/>
+            </a:fillRef>
+            <a:effectRef idx="0">
+              <a:schemeClr val="accent1"/>
+            </a:effectRef>
+            <a:fontRef idx="minor">
+              <a:schemeClr val="lt1"/>
+            </a:fontRef>
+          </p:style>
+          <p:txBody>
+            <a:bodyPr rtlCol="0" anchor="ctr"/>
+            <a:lstStyle/>
+            <a:p>
+              <a:pPr algn="ctr"/>
+              <a:endParaRPr lang="en-US" sz="800">
+                <a:latin typeface="Arial" pitchFamily="34" charset="0"/>
+                <a:cs typeface="Arial" pitchFamily="34" charset="0"/>
+              </a:endParaRPr>
+            </a:p>
+          </p:txBody>
+        </p:sp>
+      </p:grpSp>
+      <p:sp>
+        <p:nvSpPr>
+          <p:cNvPr id="62" name="Rectangle 61"/>
+          <p:cNvSpPr/>
+          <p:nvPr/>
+        </p:nvSpPr>
+        <p:spPr>
+          <a:xfrm>
+            <a:off x="972910" y="235226"/>
+            <a:ext cx="1900431" cy="811253"/>
+          </a:xfrm>
+          <a:prstGeom prst="rect">
+            <a:avLst/>
+          </a:prstGeom>
+          <a:solidFill>
+            <a:schemeClr val="bg1">
+              <a:lumMod val="95000"/>
+            </a:schemeClr>
+          </a:solidFill>
+          <a:ln w="12700">
+            <a:solidFill>
+              <a:schemeClr val="tx1"/>
+            </a:solidFill>
+            <a:prstDash val="dash"/>
+          </a:ln>
+        </p:spPr>
+        <p:style>
+          <a:lnRef idx="2">
+            <a:schemeClr val="accent1">
+              <a:shade val="50000"/>
+            </a:schemeClr>
+          </a:lnRef>
+          <a:fillRef idx="1">
+            <a:schemeClr val="accent1"/>
+          </a:fillRef>
+          <a:effectRef idx="0">
+            <a:schemeClr val="accent1"/>
+          </a:effectRef>
+          <a:fontRef idx="minor">
+            <a:schemeClr val="lt1"/>
+          </a:fontRef>
+        </p:style>
+        <p:txBody>
+          <a:bodyPr rtlCol="0" anchor="ctr"/>
+          <a:lstStyle/>
+          <a:p>
+            <a:pPr algn="ctr"/>
+            <a:endParaRPr lang="en-US" sz="800" dirty="0" smtClean="0">
+              <a:solidFill>
+                <a:schemeClr val="tx1"/>
+              </a:solidFill>
+              <a:latin typeface="Arial" pitchFamily="34" charset="0"/>
+              <a:cs typeface="Arial" pitchFamily="34" charset="0"/>
+            </a:endParaRPr>
+          </a:p>
+        </p:txBody>
+      </p:sp>
+      <p:sp>
+        <p:nvSpPr>
+          <p:cNvPr id="99" name="TextBox 98"/>
+          <p:cNvSpPr txBox="1"/>
+          <p:nvPr/>
+        </p:nvSpPr>
+        <p:spPr>
+          <a:xfrm>
+            <a:off x="1378071" y="1060822"/>
+            <a:ext cx="1689819" cy="215444"/>
+          </a:xfrm>
+          <a:prstGeom prst="rect">
+            <a:avLst/>
+          </a:prstGeom>
+          <a:noFill/>
+        </p:spPr>
+        <p:txBody>
+          <a:bodyPr wrap="square" rtlCol="0">
+            <a:spAutoFit/>
+          </a:bodyPr>
+          <a:lstStyle/>
+          <a:p>
+            <a:pPr algn="r"/>
+            <a:r>
+              <a:rPr lang="en-US" sz="800" dirty="0" smtClean="0">
+                <a:latin typeface="Arial" pitchFamily="34" charset="0"/>
+                <a:cs typeface="Arial" pitchFamily="34" charset="0"/>
+              </a:rPr>
+              <a:t>Destination Address Calculation</a:t>
+            </a:r>
+            <a:endParaRPr lang="en-US" sz="800" dirty="0">
+              <a:latin typeface="Arial" pitchFamily="34" charset="0"/>
+              <a:cs typeface="Arial" pitchFamily="34" charset="0"/>
+            </a:endParaRPr>
+          </a:p>
+        </p:txBody>
+      </p:sp>
+      <p:sp>
+        <p:nvSpPr>
+          <p:cNvPr id="86" name="TextBox 85"/>
+          <p:cNvSpPr txBox="1"/>
+          <p:nvPr/>
+        </p:nvSpPr>
+        <p:spPr>
+          <a:xfrm>
+            <a:off x="4711548" y="598357"/>
+            <a:ext cx="608679" cy="215444"/>
+          </a:xfrm>
+          <a:prstGeom prst="rect">
+            <a:avLst/>
+          </a:prstGeom>
+          <a:noFill/>
+        </p:spPr>
+        <p:txBody>
+          <a:bodyPr wrap="square" rtlCol="0">
+            <a:spAutoFit/>
+          </a:bodyPr>
+          <a:lstStyle/>
+          <a:p>
+            <a:r>
+              <a:rPr lang="en-US" sz="800" dirty="0" err="1" smtClean="0">
+                <a:latin typeface="Arial" pitchFamily="34" charset="0"/>
+                <a:cs typeface="Arial" pitchFamily="34" charset="0"/>
+              </a:rPr>
+              <a:t>inst</a:t>
+            </a:r>
+            <a:r>
+              <a:rPr lang="en-US" sz="800" dirty="0" smtClean="0">
+                <a:latin typeface="Arial" pitchFamily="34" charset="0"/>
+                <a:cs typeface="Arial" pitchFamily="34" charset="0"/>
+              </a:rPr>
+              <a:t> type</a:t>
+            </a:r>
+          </a:p>
+        </p:txBody>
+      </p:sp>
+      <p:grpSp>
+        <p:nvGrpSpPr>
+          <p:cNvPr id="65" name="Group 64"/>
+          <p:cNvGrpSpPr/>
+          <p:nvPr/>
+        </p:nvGrpSpPr>
+        <p:grpSpPr>
+          <a:xfrm>
+            <a:off x="2221174" y="610059"/>
+            <a:ext cx="619803" cy="220687"/>
+            <a:chOff x="1687647" y="877689"/>
+            <a:chExt cx="555060" cy="220687"/>
+          </a:xfrm>
+        </p:grpSpPr>
+        <p:grpSp>
+          <p:nvGrpSpPr>
+            <p:cNvPr id="67" name="Group 66"/>
+            <p:cNvGrpSpPr/>
+            <p:nvPr/>
+          </p:nvGrpSpPr>
+          <p:grpSpPr>
+            <a:xfrm>
+              <a:off x="1687647" y="896701"/>
+              <a:ext cx="202217" cy="201675"/>
+              <a:chOff x="1569499" y="3442406"/>
+              <a:chExt cx="187223" cy="211562"/>
+            </a:xfrm>
+          </p:grpSpPr>
+          <p:sp>
+            <p:nvSpPr>
+              <p:cNvPr id="72" name="Isosceles Triangle 71"/>
+              <p:cNvSpPr/>
+              <p:nvPr/>
+            </p:nvSpPr>
+            <p:spPr>
+              <a:xfrm rot="5400000">
+                <a:off x="1568302" y="3465547"/>
+                <a:ext cx="211562" cy="165279"/>
+              </a:xfrm>
+              <a:prstGeom prst="triangle">
+                <a:avLst/>
+              </a:prstGeom>
+              <a:solidFill>
+                <a:schemeClr val="bg1"/>
+              </a:solidFill>
+              <a:ln w="12700">
+                <a:solidFill>
+                  <a:schemeClr val="tx1"/>
+                </a:solidFill>
+              </a:ln>
+            </p:spPr>
+            <p:style>
+              <a:lnRef idx="2">
+                <a:schemeClr val="accent1">
+                  <a:shade val="50000"/>
+                </a:schemeClr>
+              </a:lnRef>
+              <a:fillRef idx="1">
+                <a:schemeClr val="accent1"/>
+              </a:fillRef>
+              <a:effectRef idx="0">
+                <a:schemeClr val="accent1"/>
+              </a:effectRef>
+              <a:fontRef idx="minor">
+                <a:schemeClr val="lt1"/>
+              </a:fontRef>
+            </p:style>
+            <p:txBody>
+              <a:bodyPr rtlCol="0" anchor="ctr"/>
+              <a:lstStyle/>
+              <a:p>
+                <a:pPr algn="ctr"/>
+                <a:endParaRPr lang="en-US" sz="800">
+                  <a:latin typeface="Arial" pitchFamily="34" charset="0"/>
+                  <a:cs typeface="Arial" pitchFamily="34" charset="0"/>
+                </a:endParaRPr>
+              </a:p>
+            </p:txBody>
+          </p:sp>
+          <p:sp>
+            <p:nvSpPr>
+              <p:cNvPr id="73" name="Isosceles Triangle 72"/>
+              <p:cNvSpPr/>
+              <p:nvPr/>
+            </p:nvSpPr>
+            <p:spPr>
+              <a:xfrm rot="5400000">
+                <a:off x="1545492" y="3466413"/>
+                <a:ext cx="211561" cy="163548"/>
+              </a:xfrm>
+              <a:prstGeom prst="triangle">
+                <a:avLst/>
+              </a:prstGeom>
+              <a:solidFill>
+                <a:srgbClr val="FFFFCC"/>
+              </a:solidFill>
+              <a:ln w="12700">
+                <a:solidFill>
+                  <a:srgbClr val="FFFFCC"/>
+                </a:solidFill>
+              </a:ln>
+            </p:spPr>
+            <p:style>
+              <a:lnRef idx="2">
+                <a:schemeClr val="accent1">
+                  <a:shade val="50000"/>
+                </a:schemeClr>
+              </a:lnRef>
+              <a:fillRef idx="1">
+                <a:schemeClr val="accent1"/>
+              </a:fillRef>
+              <a:effectRef idx="0">
+                <a:schemeClr val="accent1"/>
+              </a:effectRef>
+              <a:fontRef idx="minor">
+                <a:schemeClr val="lt1"/>
+              </a:fontRef>
+            </p:style>
+            <p:txBody>
+              <a:bodyPr rtlCol="0" anchor="ctr"/>
+              <a:lstStyle/>
+              <a:p>
+                <a:pPr algn="ctr"/>
+                <a:endParaRPr lang="en-US" sz="800">
+                  <a:latin typeface="Arial" pitchFamily="34" charset="0"/>
+                  <a:cs typeface="Arial" pitchFamily="34" charset="0"/>
+                </a:endParaRPr>
+              </a:p>
+            </p:txBody>
+          </p:sp>
+        </p:grpSp>
+        <p:sp>
+          <p:nvSpPr>
+            <p:cNvPr id="69" name="TextBox 68"/>
+            <p:cNvSpPr txBox="1"/>
+            <p:nvPr/>
+          </p:nvSpPr>
+          <p:spPr>
+            <a:xfrm>
+              <a:off x="1843806" y="877689"/>
+              <a:ext cx="398901" cy="215444"/>
+            </a:xfrm>
+            <a:prstGeom prst="rect">
+              <a:avLst/>
+            </a:prstGeom>
+            <a:noFill/>
+          </p:spPr>
+          <p:txBody>
+            <a:bodyPr wrap="square" rtlCol="0">
+              <a:spAutoFit/>
+            </a:bodyPr>
+            <a:lstStyle/>
+            <a:p>
+              <a:endParaRPr lang="en-US" sz="800" dirty="0" smtClean="0">
+                <a:latin typeface="Arial" pitchFamily="34" charset="0"/>
+                <a:cs typeface="Arial" pitchFamily="34" charset="0"/>
+              </a:endParaRPr>
+            </a:p>
+          </p:txBody>
+        </p:sp>
+      </p:grpSp>
+      <p:grpSp>
+        <p:nvGrpSpPr>
+          <p:cNvPr id="120" name="Group 119"/>
+          <p:cNvGrpSpPr/>
+          <p:nvPr/>
+        </p:nvGrpSpPr>
+        <p:grpSpPr>
+          <a:xfrm>
+            <a:off x="2257445" y="402809"/>
+            <a:ext cx="516229" cy="417431"/>
+            <a:chOff x="1569499" y="3233315"/>
+            <a:chExt cx="428024" cy="614235"/>
+          </a:xfrm>
+        </p:grpSpPr>
+        <p:sp>
+          <p:nvSpPr>
+            <p:cNvPr id="122" name="Trapezoid 121"/>
+            <p:cNvSpPr/>
+            <p:nvPr/>
+          </p:nvSpPr>
+          <p:spPr>
+            <a:xfrm rot="5400000">
+              <a:off x="1486175" y="3336203"/>
+              <a:ext cx="614235" cy="408460"/>
+            </a:xfrm>
+            <a:prstGeom prst="trapezoid">
+              <a:avLst>
+                <a:gd name="adj" fmla="val 25776"/>
+              </a:avLst>
+            </a:prstGeom>
+            <a:solidFill>
+              <a:srgbClr val="FFFFCC"/>
+            </a:solidFill>
+            <a:ln w="12700">
+              <a:solidFill>
+                <a:schemeClr val="tx1"/>
+              </a:solidFill>
+            </a:ln>
+          </p:spPr>
+          <p:style>
+            <a:lnRef idx="2">
+              <a:schemeClr val="accent1">
+                <a:shade val="50000"/>
+              </a:schemeClr>
+            </a:lnRef>
+            <a:fillRef idx="1">
+              <a:schemeClr val="accent1"/>
+            </a:fillRef>
+            <a:effectRef idx="0">
+              <a:schemeClr val="accent1"/>
+            </a:effectRef>
+            <a:fontRef idx="minor">
+              <a:schemeClr val="lt1"/>
+            </a:fontRef>
+          </p:style>
+          <p:txBody>
+            <a:bodyPr vert="vert270" rtlCol="0" anchor="ctr" anchorCtr="0"/>
+            <a:lstStyle/>
+            <a:p>
+              <a:pPr algn="ctr"/>
+              <a:endParaRPr lang="en-US" sz="800" dirty="0">
+                <a:solidFill>
+                  <a:sysClr val="windowText" lastClr="000000"/>
+                </a:solidFill>
+                <a:latin typeface="Arial" pitchFamily="34" charset="0"/>
+                <a:cs typeface="Arial" pitchFamily="34" charset="0"/>
+              </a:endParaRPr>
+            </a:p>
+          </p:txBody>
+        </p:sp>
+        <p:sp>
+          <p:nvSpPr>
+            <p:cNvPr id="123" name="Isosceles Triangle 122"/>
+            <p:cNvSpPr/>
+            <p:nvPr/>
+          </p:nvSpPr>
+          <p:spPr>
+            <a:xfrm rot="5400000">
+              <a:off x="1568302" y="3465547"/>
+              <a:ext cx="211562" cy="165279"/>
+            </a:xfrm>
+            <a:prstGeom prst="triangle">
+              <a:avLst/>
+            </a:prstGeom>
+            <a:solidFill>
+              <a:schemeClr val="bg1"/>
+            </a:solidFill>
+            <a:ln w="12700">
+              <a:solidFill>
+                <a:schemeClr val="tx1"/>
+              </a:solidFill>
+            </a:ln>
+          </p:spPr>
+          <p:style>
+            <a:lnRef idx="2">
+              <a:schemeClr val="accent1">
+                <a:shade val="50000"/>
+              </a:schemeClr>
+            </a:lnRef>
+            <a:fillRef idx="1">
+              <a:schemeClr val="accent1"/>
+            </a:fillRef>
+            <a:effectRef idx="0">
+              <a:schemeClr val="accent1"/>
+            </a:effectRef>
+            <a:fontRef idx="minor">
+              <a:schemeClr val="lt1"/>
+            </a:fontRef>
+          </p:style>
+          <p:txBody>
+            <a:bodyPr rtlCol="0" anchor="ctr"/>
+            <a:lstStyle/>
+            <a:p>
+              <a:pPr algn="ctr"/>
+              <a:endParaRPr lang="en-US" sz="800">
+                <a:latin typeface="Arial" pitchFamily="34" charset="0"/>
+                <a:cs typeface="Arial" pitchFamily="34" charset="0"/>
+              </a:endParaRPr>
+            </a:p>
+          </p:txBody>
+        </p:sp>
+        <p:sp>
+          <p:nvSpPr>
+            <p:cNvPr id="124" name="Isosceles Triangle 123"/>
+            <p:cNvSpPr/>
+            <p:nvPr/>
+          </p:nvSpPr>
+          <p:spPr>
+            <a:xfrm rot="5400000">
+              <a:off x="1545492" y="3466413"/>
+              <a:ext cx="211561" cy="163548"/>
+            </a:xfrm>
+            <a:prstGeom prst="triangle">
+              <a:avLst/>
+            </a:prstGeom>
+            <a:solidFill>
+              <a:schemeClr val="bg1">
+                <a:lumMod val="95000"/>
+              </a:schemeClr>
+            </a:solidFill>
+            <a:ln w="12700">
+              <a:solidFill>
+                <a:schemeClr val="bg1">
+                  <a:lumMod val="95000"/>
+                </a:schemeClr>
+              </a:solidFill>
+            </a:ln>
+          </p:spPr>
+          <p:style>
+            <a:lnRef idx="2">
+              <a:schemeClr val="accent1">
+                <a:shade val="50000"/>
+              </a:schemeClr>
+            </a:lnRef>
+            <a:fillRef idx="1">
+              <a:schemeClr val="accent1"/>
+            </a:fillRef>
+            <a:effectRef idx="0">
+              <a:schemeClr val="accent1"/>
+            </a:effectRef>
+            <a:fontRef idx="minor">
+              <a:schemeClr val="lt1"/>
+            </a:fontRef>
+          </p:style>
+          <p:txBody>
+            <a:bodyPr rtlCol="0" anchor="ctr"/>
+            <a:lstStyle/>
+            <a:p>
+              <a:pPr algn="ctr"/>
+              <a:endParaRPr lang="en-US" sz="800">
+                <a:latin typeface="Arial" pitchFamily="34" charset="0"/>
+                <a:cs typeface="Arial" pitchFamily="34" charset="0"/>
+              </a:endParaRPr>
+            </a:p>
+          </p:txBody>
+        </p:sp>
+      </p:grpSp>
+      <p:sp>
+        <p:nvSpPr>
+          <p:cNvPr id="45" name="Rectangle 44"/>
+          <p:cNvSpPr/>
+          <p:nvPr/>
+        </p:nvSpPr>
+        <p:spPr>
+          <a:xfrm>
+            <a:off x="806548" y="45700"/>
+            <a:ext cx="1874767" cy="785335"/>
+          </a:xfrm>
+          <a:prstGeom prst="rect">
+            <a:avLst/>
+          </a:prstGeom>
+          <a:solidFill>
+            <a:schemeClr val="bg1">
+              <a:lumMod val="95000"/>
+            </a:schemeClr>
+          </a:solidFill>
+          <a:ln w="12700">
+            <a:solidFill>
+              <a:schemeClr val="tx1"/>
+            </a:solidFill>
+            <a:prstDash val="dash"/>
+          </a:ln>
+        </p:spPr>
+        <p:style>
+          <a:lnRef idx="2">
+            <a:schemeClr val="accent1">
+              <a:shade val="50000"/>
+            </a:schemeClr>
+          </a:lnRef>
+          <a:fillRef idx="1">
+            <a:schemeClr val="accent1"/>
+          </a:fillRef>
+          <a:effectRef idx="0">
+            <a:schemeClr val="accent1"/>
+          </a:effectRef>
+          <a:fontRef idx="minor">
+            <a:schemeClr val="lt1"/>
+          </a:fontRef>
+        </p:style>
+        <p:txBody>
+          <a:bodyPr rtlCol="0" anchor="ctr"/>
+          <a:lstStyle/>
+          <a:p>
+            <a:pPr algn="ctr"/>
+            <a:endParaRPr lang="en-US" sz="800" dirty="0" smtClean="0">
+              <a:solidFill>
+                <a:schemeClr val="tx1"/>
+              </a:solidFill>
+              <a:latin typeface="Arial" pitchFamily="34" charset="0"/>
+              <a:cs typeface="Arial" pitchFamily="34" charset="0"/>
+            </a:endParaRPr>
+          </a:p>
+        </p:txBody>
+      </p:sp>
+      <p:cxnSp>
+        <p:nvCxnSpPr>
+          <p:cNvPr id="54" name="Straight Arrow Connector 53"/>
+          <p:cNvCxnSpPr/>
+          <p:nvPr/>
+        </p:nvCxnSpPr>
+        <p:spPr>
+          <a:xfrm>
+            <a:off x="2514703" y="406610"/>
+            <a:ext cx="1049929" cy="0"/>
+          </a:xfrm>
+          <a:prstGeom prst="straightConnector1">
+            <a:avLst/>
+          </a:prstGeom>
+          <a:ln w="19050">
+            <a:solidFill>
+              <a:schemeClr val="tx1"/>
+            </a:solidFill>
+            <a:headEnd w="sm" len="sm"/>
+            <a:tailEnd type="arrow" w="sm" len="sm"/>
+          </a:ln>
+        </p:spPr>
+        <p:style>
+          <a:lnRef idx="1">
+            <a:schemeClr val="accent1"/>
+          </a:lnRef>
+          <a:fillRef idx="0">
+            <a:schemeClr val="accent1"/>
+          </a:fillRef>
+          <a:effectRef idx="0">
+            <a:schemeClr val="accent1"/>
+          </a:effectRef>
+          <a:fontRef idx="minor">
+            <a:schemeClr val="tx1"/>
+          </a:fontRef>
+        </p:style>
+      </p:cxnSp>
+      <p:cxnSp>
+        <p:nvCxnSpPr>
+          <p:cNvPr id="13" name="Straight Arrow Connector 12"/>
+          <p:cNvCxnSpPr/>
+          <p:nvPr/>
+        </p:nvCxnSpPr>
+        <p:spPr>
+          <a:xfrm>
+            <a:off x="1814989" y="264561"/>
+            <a:ext cx="226041" cy="0"/>
+          </a:xfrm>
+          <a:prstGeom prst="straightConnector1">
+            <a:avLst/>
+          </a:prstGeom>
+          <a:ln w="19050">
+            <a:solidFill>
+              <a:schemeClr val="tx1"/>
+            </a:solidFill>
+            <a:headEnd w="sm" len="sm"/>
+            <a:tailEnd type="arrow" w="sm" len="sm"/>
+          </a:ln>
+        </p:spPr>
+        <p:style>
+          <a:lnRef idx="1">
+            <a:schemeClr val="accent1"/>
+          </a:lnRef>
+          <a:fillRef idx="0">
+            <a:schemeClr val="accent1"/>
+          </a:fillRef>
+          <a:effectRef idx="0">
+            <a:schemeClr val="accent1"/>
+          </a:effectRef>
+          <a:fontRef idx="minor">
+            <a:schemeClr val="tx1"/>
+          </a:fontRef>
+        </p:style>
+      </p:cxnSp>
+      <p:grpSp>
+        <p:nvGrpSpPr>
+          <p:cNvPr id="14" name="Group 13"/>
+          <p:cNvGrpSpPr/>
+          <p:nvPr/>
+        </p:nvGrpSpPr>
+        <p:grpSpPr>
+          <a:xfrm>
+            <a:off x="806548" y="126521"/>
+            <a:ext cx="1097408" cy="266085"/>
+            <a:chOff x="3632587" y="1650838"/>
+            <a:chExt cx="1097408" cy="266085"/>
+          </a:xfrm>
+        </p:grpSpPr>
+        <p:sp>
+          <p:nvSpPr>
+            <p:cNvPr id="15" name="TextBox 14"/>
+            <p:cNvSpPr txBox="1"/>
+            <p:nvPr/>
+          </p:nvSpPr>
+          <p:spPr>
+            <a:xfrm rot="5400000">
+              <a:off x="4317549" y="1676401"/>
+              <a:ext cx="254445" cy="215444"/>
+            </a:xfrm>
+            <a:prstGeom prst="rect">
+              <a:avLst/>
+            </a:prstGeom>
+            <a:noFill/>
+          </p:spPr>
+          <p:txBody>
+            <a:bodyPr wrap="square" rtlCol="0">
+              <a:spAutoFit/>
+            </a:bodyPr>
+            <a:lstStyle/>
+            <a:p>
+              <a:r>
+                <a:rPr lang="en-US" sz="800" dirty="0" smtClean="0">
+                  <a:latin typeface="Arial" pitchFamily="34" charset="0"/>
+                  <a:cs typeface="Arial" pitchFamily="34" charset="0"/>
+                </a:rPr>
+                <a:t>…</a:t>
+              </a:r>
+            </a:p>
+          </p:txBody>
+        </p:sp>
+        <p:sp>
+          <p:nvSpPr>
+            <p:cNvPr id="16" name="Trapezoid 15"/>
+            <p:cNvSpPr/>
+            <p:nvPr/>
+          </p:nvSpPr>
+          <p:spPr>
+            <a:xfrm rot="5400000">
+              <a:off x="4517956" y="1704883"/>
+              <a:ext cx="266084" cy="157995"/>
+            </a:xfrm>
+            <a:prstGeom prst="trapezoid">
+              <a:avLst>
+                <a:gd name="adj" fmla="val 32217"/>
+              </a:avLst>
+            </a:prstGeom>
+            <a:solidFill>
+              <a:srgbClr val="FFFFCC"/>
+            </a:solidFill>
+            <a:ln w="12700">
+              <a:solidFill>
+                <a:schemeClr val="tx1"/>
+              </a:solidFill>
+            </a:ln>
+          </p:spPr>
+          <p:style>
+            <a:lnRef idx="2">
+              <a:schemeClr val="accent1">
+                <a:shade val="50000"/>
+              </a:schemeClr>
+            </a:lnRef>
+            <a:fillRef idx="1">
+              <a:schemeClr val="accent1"/>
+            </a:fillRef>
+            <a:effectRef idx="0">
+              <a:schemeClr val="accent1"/>
+            </a:effectRef>
+            <a:fontRef idx="minor">
+              <a:schemeClr val="lt1"/>
+            </a:fontRef>
+          </p:style>
+          <p:txBody>
+            <a:bodyPr vert="vert270" rtlCol="0" anchor="ctr"/>
+            <a:lstStyle/>
+            <a:p>
+              <a:pPr algn="ctr"/>
+              <a:r>
+                <a:rPr lang="en-US" sz="800" dirty="0" smtClean="0">
+                  <a:solidFill>
+                    <a:sysClr val="windowText" lastClr="000000"/>
+                  </a:solidFill>
+                  <a:latin typeface="Arial" pitchFamily="34" charset="0"/>
+                  <a:cs typeface="Arial" pitchFamily="34" charset="0"/>
+                </a:rPr>
+                <a:t> </a:t>
+              </a:r>
+              <a:endParaRPr lang="en-US" sz="800" dirty="0">
+                <a:solidFill>
+                  <a:sysClr val="windowText" lastClr="000000"/>
+                </a:solidFill>
+                <a:latin typeface="Arial" pitchFamily="34" charset="0"/>
+                <a:cs typeface="Arial" pitchFamily="34" charset="0"/>
+              </a:endParaRPr>
+            </a:p>
+          </p:txBody>
+        </p:sp>
+        <p:cxnSp>
+          <p:nvCxnSpPr>
+            <p:cNvPr id="17" name="Straight Arrow Connector 16"/>
+            <p:cNvCxnSpPr/>
+            <p:nvPr/>
+          </p:nvCxnSpPr>
+          <p:spPr>
+            <a:xfrm>
+              <a:off x="4368800" y="1676400"/>
+              <a:ext cx="203200" cy="0"/>
+            </a:xfrm>
+            <a:prstGeom prst="straightConnector1">
+              <a:avLst/>
+            </a:prstGeom>
+            <a:ln w="19050">
+              <a:solidFill>
+                <a:schemeClr val="tx1"/>
+              </a:solidFill>
+              <a:headEnd w="sm" len="sm"/>
+              <a:tailEnd type="arrow" w="sm" len="sm"/>
+            </a:ln>
+          </p:spPr>
+          <p:style>
+            <a:lnRef idx="1">
+              <a:schemeClr val="accent1"/>
+            </a:lnRef>
+            <a:fillRef idx="0">
+              <a:schemeClr val="accent1"/>
+            </a:fillRef>
+            <a:effectRef idx="0">
+              <a:schemeClr val="accent1"/>
+            </a:effectRef>
+            <a:fontRef idx="minor">
+              <a:schemeClr val="tx1"/>
+            </a:fontRef>
+          </p:style>
+        </p:cxnSp>
+        <p:cxnSp>
+          <p:nvCxnSpPr>
+            <p:cNvPr id="18" name="Straight Arrow Connector 17"/>
+            <p:cNvCxnSpPr/>
+            <p:nvPr/>
+          </p:nvCxnSpPr>
+          <p:spPr>
+            <a:xfrm>
+              <a:off x="4368800" y="1885049"/>
+              <a:ext cx="203200" cy="0"/>
+            </a:xfrm>
+            <a:prstGeom prst="straightConnector1">
+              <a:avLst/>
+            </a:prstGeom>
+            <a:ln w="19050">
+              <a:solidFill>
+                <a:schemeClr val="tx1"/>
+              </a:solidFill>
+              <a:headEnd w="sm" len="sm"/>
+              <a:tailEnd type="arrow" w="sm" len="sm"/>
+            </a:ln>
+          </p:spPr>
+          <p:style>
+            <a:lnRef idx="1">
+              <a:schemeClr val="accent1"/>
+            </a:lnRef>
+            <a:fillRef idx="0">
+              <a:schemeClr val="accent1"/>
+            </a:fillRef>
+            <a:effectRef idx="0">
+              <a:schemeClr val="accent1"/>
+            </a:effectRef>
+            <a:fontRef idx="minor">
+              <a:schemeClr val="tx1"/>
+            </a:fontRef>
+          </p:style>
+        </p:cxnSp>
+        <p:sp>
+          <p:nvSpPr>
+            <p:cNvPr id="19" name="TextBox 18"/>
+            <p:cNvSpPr txBox="1"/>
+            <p:nvPr/>
+          </p:nvSpPr>
+          <p:spPr>
+            <a:xfrm>
+              <a:off x="3632587" y="1650838"/>
+              <a:ext cx="774465" cy="215444"/>
+            </a:xfrm>
+            <a:prstGeom prst="rect">
+              <a:avLst/>
+            </a:prstGeom>
+            <a:noFill/>
+          </p:spPr>
+          <p:txBody>
+            <a:bodyPr wrap="square" rtlCol="0">
+              <a:spAutoFit/>
+            </a:bodyPr>
+            <a:lstStyle/>
+            <a:p>
+              <a:pPr algn="r"/>
+              <a:r>
+                <a:rPr lang="en-US" sz="800" dirty="0" smtClean="0">
+                  <a:latin typeface="Arial" pitchFamily="34" charset="0"/>
+                  <a:cs typeface="Arial" pitchFamily="34" charset="0"/>
+                </a:rPr>
+                <a:t>FIFO entries</a:t>
+              </a:r>
+            </a:p>
+          </p:txBody>
+        </p:sp>
+      </p:grpSp>
+      <p:cxnSp>
+        <p:nvCxnSpPr>
+          <p:cNvPr id="24" name="Straight Arrow Connector 23"/>
+          <p:cNvCxnSpPr/>
+          <p:nvPr/>
+        </p:nvCxnSpPr>
+        <p:spPr>
+          <a:xfrm>
+            <a:off x="1542761" y="547953"/>
+            <a:ext cx="498269" cy="0"/>
+          </a:xfrm>
+          <a:prstGeom prst="straightConnector1">
+            <a:avLst/>
+          </a:prstGeom>
+          <a:ln w="19050">
+            <a:solidFill>
+              <a:schemeClr val="tx1"/>
+            </a:solidFill>
+            <a:headEnd w="sm" len="sm"/>
+            <a:tailEnd type="arrow" w="sm" len="sm"/>
+          </a:ln>
+        </p:spPr>
+        <p:style>
+          <a:lnRef idx="1">
+            <a:schemeClr val="accent1"/>
+          </a:lnRef>
+          <a:fillRef idx="0">
+            <a:schemeClr val="accent1"/>
+          </a:fillRef>
+          <a:effectRef idx="0">
+            <a:schemeClr val="accent1"/>
+          </a:effectRef>
+          <a:fontRef idx="minor">
+            <a:schemeClr val="tx1"/>
+          </a:fontRef>
+        </p:style>
+      </p:cxnSp>
+      <p:grpSp>
+        <p:nvGrpSpPr>
+          <p:cNvPr id="35" name="Group 34"/>
+          <p:cNvGrpSpPr/>
+          <p:nvPr/>
+        </p:nvGrpSpPr>
+        <p:grpSpPr>
+          <a:xfrm>
+            <a:off x="2023112" y="192626"/>
+            <a:ext cx="615895" cy="417431"/>
+            <a:chOff x="1687650" y="697380"/>
+            <a:chExt cx="551559" cy="585529"/>
+          </a:xfrm>
+        </p:grpSpPr>
+        <p:grpSp>
+          <p:nvGrpSpPr>
+            <p:cNvPr id="36" name="Group 35"/>
+            <p:cNvGrpSpPr/>
+            <p:nvPr/>
+          </p:nvGrpSpPr>
+          <p:grpSpPr>
+            <a:xfrm>
+              <a:off x="1687650" y="697380"/>
+              <a:ext cx="462306" cy="585529"/>
+              <a:chOff x="1569499" y="3233317"/>
+              <a:chExt cx="428026" cy="614235"/>
+            </a:xfrm>
+          </p:grpSpPr>
+          <p:sp>
+            <p:nvSpPr>
+              <p:cNvPr id="38" name="Trapezoid 37"/>
+              <p:cNvSpPr/>
+              <p:nvPr/>
+            </p:nvSpPr>
+            <p:spPr>
+              <a:xfrm rot="5400000">
+                <a:off x="1486177" y="3336204"/>
+                <a:ext cx="614235" cy="408461"/>
+              </a:xfrm>
+              <a:prstGeom prst="trapezoid">
+                <a:avLst>
+                  <a:gd name="adj" fmla="val 25776"/>
+                </a:avLst>
+              </a:prstGeom>
+              <a:solidFill>
+                <a:srgbClr val="FFFFCC"/>
+              </a:solidFill>
+              <a:ln w="12700">
+                <a:solidFill>
+                  <a:schemeClr val="tx1"/>
+                </a:solidFill>
+              </a:ln>
+            </p:spPr>
+            <p:style>
+              <a:lnRef idx="2">
+                <a:schemeClr val="accent1">
+                  <a:shade val="50000"/>
+                </a:schemeClr>
+              </a:lnRef>
+              <a:fillRef idx="1">
+                <a:schemeClr val="accent1"/>
+              </a:fillRef>
+              <a:effectRef idx="0">
+                <a:schemeClr val="accent1"/>
+              </a:effectRef>
+              <a:fontRef idx="minor">
+                <a:schemeClr val="lt1"/>
+              </a:fontRef>
+            </p:style>
+            <p:txBody>
+              <a:bodyPr vert="vert270" rtlCol="0" anchor="ctr" anchorCtr="0"/>
+              <a:lstStyle/>
+              <a:p>
+                <a:pPr algn="ctr"/>
+                <a:endParaRPr lang="en-US" sz="800" dirty="0">
+                  <a:solidFill>
+                    <a:sysClr val="windowText" lastClr="000000"/>
+                  </a:solidFill>
+                  <a:latin typeface="Arial" pitchFamily="34" charset="0"/>
+                  <a:cs typeface="Arial" pitchFamily="34" charset="0"/>
+                </a:endParaRPr>
+              </a:p>
+            </p:txBody>
+          </p:sp>
+          <p:sp>
+            <p:nvSpPr>
+              <p:cNvPr id="39" name="Isosceles Triangle 38"/>
+              <p:cNvSpPr/>
+              <p:nvPr/>
+            </p:nvSpPr>
+            <p:spPr>
+              <a:xfrm rot="5400000">
+                <a:off x="1568302" y="3465547"/>
+                <a:ext cx="211562" cy="165279"/>
+              </a:xfrm>
+              <a:prstGeom prst="triangle">
+                <a:avLst/>
+              </a:prstGeom>
+              <a:solidFill>
+                <a:schemeClr val="bg1"/>
+              </a:solidFill>
+              <a:ln w="12700">
+                <a:solidFill>
+                  <a:schemeClr val="tx1"/>
+                </a:solidFill>
+              </a:ln>
+            </p:spPr>
+            <p:style>
+              <a:lnRef idx="2">
+                <a:schemeClr val="accent1">
+                  <a:shade val="50000"/>
+                </a:schemeClr>
+              </a:lnRef>
+              <a:fillRef idx="1">
+                <a:schemeClr val="accent1"/>
+              </a:fillRef>
+              <a:effectRef idx="0">
+                <a:schemeClr val="accent1"/>
+              </a:effectRef>
+              <a:fontRef idx="minor">
+                <a:schemeClr val="lt1"/>
+              </a:fontRef>
+            </p:style>
+            <p:txBody>
+              <a:bodyPr rtlCol="0" anchor="ctr"/>
+              <a:lstStyle/>
+              <a:p>
+                <a:pPr algn="ctr"/>
+                <a:endParaRPr lang="en-US" sz="800">
+                  <a:latin typeface="Arial" pitchFamily="34" charset="0"/>
+                  <a:cs typeface="Arial" pitchFamily="34" charset="0"/>
+                </a:endParaRPr>
+              </a:p>
+            </p:txBody>
+          </p:sp>
+          <p:sp>
+            <p:nvSpPr>
+              <p:cNvPr id="40" name="Isosceles Triangle 39"/>
+              <p:cNvSpPr/>
+              <p:nvPr/>
+            </p:nvSpPr>
+            <p:spPr>
+              <a:xfrm rot="5400000">
+                <a:off x="1545492" y="3466413"/>
+                <a:ext cx="211561" cy="163548"/>
+              </a:xfrm>
+              <a:prstGeom prst="triangle">
+                <a:avLst/>
+              </a:prstGeom>
+              <a:solidFill>
+                <a:schemeClr val="bg1">
+                  <a:lumMod val="95000"/>
+                </a:schemeClr>
+              </a:solidFill>
+              <a:ln w="12700">
+                <a:solidFill>
+                  <a:schemeClr val="bg1">
+                    <a:lumMod val="95000"/>
+                  </a:schemeClr>
+                </a:solidFill>
+              </a:ln>
+            </p:spPr>
+            <p:style>
+              <a:lnRef idx="2">
+                <a:schemeClr val="accent1">
+                  <a:shade val="50000"/>
+                </a:schemeClr>
+              </a:lnRef>
+              <a:fillRef idx="1">
+                <a:schemeClr val="accent1"/>
+              </a:fillRef>
+              <a:effectRef idx="0">
+                <a:schemeClr val="accent1"/>
+              </a:effectRef>
+              <a:fontRef idx="minor">
+                <a:schemeClr val="lt1"/>
+              </a:fontRef>
+            </p:style>
+            <p:txBody>
+              <a:bodyPr rtlCol="0" anchor="ctr"/>
+              <a:lstStyle/>
+              <a:p>
+                <a:pPr algn="ctr"/>
+                <a:endParaRPr lang="en-US" sz="800">
+                  <a:latin typeface="Arial" pitchFamily="34" charset="0"/>
+                  <a:cs typeface="Arial" pitchFamily="34" charset="0"/>
+                </a:endParaRPr>
+              </a:p>
+            </p:txBody>
+          </p:sp>
+        </p:grpSp>
+        <p:sp>
+          <p:nvSpPr>
+            <p:cNvPr id="37" name="TextBox 36"/>
+            <p:cNvSpPr txBox="1"/>
+            <p:nvPr/>
+          </p:nvSpPr>
+          <p:spPr>
+            <a:xfrm>
+              <a:off x="1840308" y="834440"/>
+              <a:ext cx="398901" cy="215444"/>
+            </a:xfrm>
+            <a:prstGeom prst="rect">
+              <a:avLst/>
+            </a:prstGeom>
+            <a:noFill/>
+          </p:spPr>
+          <p:txBody>
+            <a:bodyPr wrap="square" rtlCol="0">
+              <a:spAutoFit/>
+            </a:bodyPr>
+            <a:lstStyle/>
+            <a:p>
+              <a:r>
+                <a:rPr lang="en-US" sz="800" dirty="0" smtClean="0">
+                  <a:latin typeface="Arial" pitchFamily="34" charset="0"/>
+                  <a:cs typeface="Arial" pitchFamily="34" charset="0"/>
+                </a:rPr>
+                <a:t>ALU</a:t>
+              </a:r>
+            </a:p>
+          </p:txBody>
+        </p:sp>
+      </p:grpSp>
+      <p:sp>
+        <p:nvSpPr>
+          <p:cNvPr id="6" name="TextBox 5"/>
+          <p:cNvSpPr txBox="1"/>
+          <p:nvPr/>
+        </p:nvSpPr>
+        <p:spPr>
+          <a:xfrm>
+            <a:off x="1075316" y="616261"/>
+            <a:ext cx="1603580" cy="215444"/>
+          </a:xfrm>
+          <a:prstGeom prst="rect">
+            <a:avLst/>
+          </a:prstGeom>
+          <a:noFill/>
+        </p:spPr>
+        <p:txBody>
+          <a:bodyPr wrap="square" rtlCol="0">
+            <a:spAutoFit/>
+          </a:bodyPr>
+          <a:lstStyle/>
+          <a:p>
+            <a:pPr algn="r"/>
+            <a:r>
+              <a:rPr lang="en-US" sz="800" dirty="0" smtClean="0">
+                <a:latin typeface="Arial" pitchFamily="34" charset="0"/>
+                <a:cs typeface="Arial" pitchFamily="34" charset="0"/>
+              </a:rPr>
+              <a:t>Source 0 Address Calculation</a:t>
+            </a:r>
+            <a:endParaRPr lang="en-US" sz="800" dirty="0">
+              <a:latin typeface="Arial" pitchFamily="34" charset="0"/>
+              <a:cs typeface="Arial" pitchFamily="34" charset="0"/>
+            </a:endParaRPr>
+          </a:p>
+        </p:txBody>
+      </p:sp>
+      <p:sp>
+        <p:nvSpPr>
+          <p:cNvPr id="76" name="Rectangle 75"/>
+          <p:cNvSpPr/>
+          <p:nvPr/>
+        </p:nvSpPr>
+        <p:spPr>
+          <a:xfrm>
+            <a:off x="3564632" y="45701"/>
+            <a:ext cx="1179519" cy="1230564"/>
+          </a:xfrm>
+          <a:prstGeom prst="rect">
+            <a:avLst/>
+          </a:prstGeom>
+          <a:solidFill>
+            <a:schemeClr val="bg1">
+              <a:lumMod val="95000"/>
+            </a:schemeClr>
+          </a:solidFill>
+          <a:ln w="12700">
+            <a:solidFill>
+              <a:schemeClr val="tx1"/>
+            </a:solidFill>
+            <a:prstDash val="dash"/>
+          </a:ln>
+        </p:spPr>
+        <p:style>
+          <a:lnRef idx="2">
+            <a:schemeClr val="accent1">
+              <a:shade val="50000"/>
+            </a:schemeClr>
+          </a:lnRef>
+          <a:fillRef idx="1">
+            <a:schemeClr val="accent1"/>
+          </a:fillRef>
+          <a:effectRef idx="0">
+            <a:schemeClr val="accent1"/>
+          </a:effectRef>
+          <a:fontRef idx="minor">
+            <a:schemeClr val="lt1"/>
+          </a:fontRef>
+        </p:style>
+        <p:txBody>
+          <a:bodyPr rtlCol="0" anchor="ctr"/>
+          <a:lstStyle/>
+          <a:p>
+            <a:pPr algn="ctr"/>
+            <a:endParaRPr lang="en-US" sz="800" dirty="0" smtClean="0">
+              <a:solidFill>
+                <a:schemeClr val="tx1"/>
+              </a:solidFill>
+              <a:latin typeface="Arial" pitchFamily="34" charset="0"/>
+              <a:cs typeface="Arial" pitchFamily="34" charset="0"/>
+            </a:endParaRPr>
+          </a:p>
+        </p:txBody>
+      </p:sp>
+      <p:sp>
+        <p:nvSpPr>
+          <p:cNvPr id="75" name="TextBox 74"/>
+          <p:cNvSpPr txBox="1"/>
+          <p:nvPr/>
+        </p:nvSpPr>
+        <p:spPr>
+          <a:xfrm>
+            <a:off x="2927162" y="636761"/>
+            <a:ext cx="675873" cy="215444"/>
+          </a:xfrm>
+          <a:prstGeom prst="rect">
+            <a:avLst/>
+          </a:prstGeom>
+          <a:noFill/>
+        </p:spPr>
+        <p:txBody>
+          <a:bodyPr wrap="square" rtlCol="0">
+            <a:spAutoFit/>
+          </a:bodyPr>
+          <a:lstStyle/>
+          <a:p>
+            <a:pPr algn="r"/>
+            <a:r>
+              <a:rPr lang="en-US" sz="800" dirty="0" err="1" smtClean="0">
+                <a:latin typeface="Arial" pitchFamily="34" charset="0"/>
+                <a:cs typeface="Arial" pitchFamily="34" charset="0"/>
+              </a:rPr>
+              <a:t>wr</a:t>
+            </a:r>
+            <a:r>
+              <a:rPr lang="en-US" sz="800" dirty="0" smtClean="0">
+                <a:latin typeface="Arial" pitchFamily="34" charset="0"/>
+                <a:cs typeface="Arial" pitchFamily="34" charset="0"/>
+              </a:rPr>
+              <a:t> </a:t>
+            </a:r>
+            <a:r>
+              <a:rPr lang="en-US" sz="800" dirty="0" err="1" smtClean="0">
+                <a:latin typeface="Arial" pitchFamily="34" charset="0"/>
+                <a:cs typeface="Arial" pitchFamily="34" charset="0"/>
+              </a:rPr>
+              <a:t>addr</a:t>
+            </a:r>
+            <a:endParaRPr lang="en-US" sz="800" dirty="0">
+              <a:latin typeface="Arial" pitchFamily="34" charset="0"/>
+              <a:cs typeface="Arial" pitchFamily="34" charset="0"/>
+            </a:endParaRPr>
+          </a:p>
+        </p:txBody>
+      </p:sp>
+      <p:sp>
+        <p:nvSpPr>
+          <p:cNvPr id="78" name="TextBox 77"/>
+          <p:cNvSpPr txBox="1"/>
+          <p:nvPr/>
+        </p:nvSpPr>
+        <p:spPr>
+          <a:xfrm>
+            <a:off x="3564631" y="1060821"/>
+            <a:ext cx="1179519" cy="215444"/>
+          </a:xfrm>
+          <a:prstGeom prst="rect">
+            <a:avLst/>
+          </a:prstGeom>
+          <a:noFill/>
+        </p:spPr>
+        <p:txBody>
+          <a:bodyPr wrap="square" rtlCol="0">
+            <a:spAutoFit/>
+          </a:bodyPr>
+          <a:lstStyle/>
+          <a:p>
+            <a:pPr algn="ctr"/>
+            <a:r>
+              <a:rPr lang="en-US" sz="800" dirty="0" smtClean="0">
+                <a:latin typeface="Arial" pitchFamily="34" charset="0"/>
+                <a:cs typeface="Arial" pitchFamily="34" charset="0"/>
+              </a:rPr>
+              <a:t>Dataflow Flags</a:t>
+            </a:r>
+            <a:endParaRPr lang="en-US" sz="800" dirty="0">
+              <a:latin typeface="Arial" pitchFamily="34" charset="0"/>
+              <a:cs typeface="Arial" pitchFamily="34" charset="0"/>
+            </a:endParaRPr>
+          </a:p>
+        </p:txBody>
+      </p:sp>
+      <p:sp>
+        <p:nvSpPr>
+          <p:cNvPr id="80" name="Rectangle 79"/>
+          <p:cNvSpPr/>
+          <p:nvPr/>
+        </p:nvSpPr>
+        <p:spPr>
+          <a:xfrm>
+            <a:off x="3635926" y="95689"/>
+            <a:ext cx="1036934" cy="310920"/>
+          </a:xfrm>
+          <a:prstGeom prst="rect">
+            <a:avLst/>
+          </a:prstGeom>
+          <a:solidFill>
+            <a:srgbClr val="FFFFCC"/>
+          </a:solidFill>
+          <a:ln w="12700">
+            <a:solidFill>
+              <a:schemeClr val="tx1"/>
+            </a:solidFill>
+          </a:ln>
+        </p:spPr>
+        <p:style>
+          <a:lnRef idx="2">
+            <a:schemeClr val="accent1">
+              <a:shade val="50000"/>
+            </a:schemeClr>
+          </a:lnRef>
+          <a:fillRef idx="1">
+            <a:schemeClr val="accent1"/>
+          </a:fillRef>
+          <a:effectRef idx="0">
+            <a:schemeClr val="accent1"/>
+          </a:effectRef>
+          <a:fontRef idx="minor">
+            <a:schemeClr val="lt1"/>
+          </a:fontRef>
+        </p:style>
+        <p:txBody>
+          <a:bodyPr rtlCol="0" anchor="ctr"/>
+          <a:lstStyle/>
+          <a:p>
+            <a:pPr algn="ctr"/>
+            <a:r>
+              <a:rPr lang="en-US" sz="800" dirty="0" smtClean="0">
+                <a:solidFill>
+                  <a:schemeClr val="tx1"/>
+                </a:solidFill>
+                <a:latin typeface="Arial" pitchFamily="34" charset="0"/>
+                <a:cs typeface="Arial" pitchFamily="34" charset="0"/>
+              </a:rPr>
+              <a:t>Dataflow Flag Register File</a:t>
+            </a:r>
+          </a:p>
+        </p:txBody>
+      </p:sp>
+      <p:sp>
+        <p:nvSpPr>
+          <p:cNvPr id="81" name="Rectangle 80"/>
+          <p:cNvSpPr/>
+          <p:nvPr/>
+        </p:nvSpPr>
+        <p:spPr>
+          <a:xfrm>
+            <a:off x="3635928" y="453169"/>
+            <a:ext cx="1036932" cy="629465"/>
+          </a:xfrm>
+          <a:prstGeom prst="rect">
+            <a:avLst/>
+          </a:prstGeom>
+          <a:solidFill>
+            <a:srgbClr val="FFFFCC"/>
+          </a:solidFill>
+          <a:ln w="12700">
+            <a:solidFill>
+              <a:schemeClr val="tx1"/>
+            </a:solidFill>
+          </a:ln>
+        </p:spPr>
+        <p:style>
+          <a:lnRef idx="2">
+            <a:schemeClr val="accent1">
+              <a:shade val="50000"/>
+            </a:schemeClr>
+          </a:lnRef>
+          <a:fillRef idx="1">
+            <a:schemeClr val="accent1"/>
+          </a:fillRef>
+          <a:effectRef idx="0">
+            <a:schemeClr val="accent1"/>
+          </a:effectRef>
+          <a:fontRef idx="minor">
+            <a:schemeClr val="lt1"/>
+          </a:fontRef>
+        </p:style>
+        <p:txBody>
+          <a:bodyPr rtlCol="0" anchor="ctr"/>
+          <a:lstStyle/>
+          <a:p>
+            <a:pPr algn="ctr"/>
+            <a:r>
+              <a:rPr lang="en-US" sz="800" dirty="0" smtClean="0">
+                <a:solidFill>
+                  <a:schemeClr val="tx1"/>
+                </a:solidFill>
+                <a:latin typeface="Arial" pitchFamily="34" charset="0"/>
+                <a:cs typeface="Arial" pitchFamily="34" charset="0"/>
+              </a:rPr>
+              <a:t>Dataflow Flag</a:t>
+            </a:r>
+          </a:p>
+          <a:p>
+            <a:pPr algn="ctr"/>
+            <a:r>
+              <a:rPr lang="en-US" sz="800" dirty="0" smtClean="0">
+                <a:solidFill>
+                  <a:schemeClr val="tx1"/>
+                </a:solidFill>
+                <a:latin typeface="Arial" pitchFamily="34" charset="0"/>
+                <a:cs typeface="Arial" pitchFamily="34" charset="0"/>
+              </a:rPr>
+              <a:t>Cache</a:t>
+            </a:r>
+          </a:p>
+        </p:txBody>
+      </p:sp>
+      <p:cxnSp>
+        <p:nvCxnSpPr>
+          <p:cNvPr id="82" name="Straight Arrow Connector 81"/>
+          <p:cNvCxnSpPr/>
+          <p:nvPr/>
+        </p:nvCxnSpPr>
+        <p:spPr>
+          <a:xfrm>
+            <a:off x="4749179" y="228487"/>
+            <a:ext cx="615854" cy="0"/>
+          </a:xfrm>
+          <a:prstGeom prst="straightConnector1">
+            <a:avLst/>
+          </a:prstGeom>
+          <a:ln w="19050">
+            <a:solidFill>
+              <a:schemeClr val="tx1"/>
+            </a:solidFill>
+            <a:headEnd w="sm" len="sm"/>
+            <a:tailEnd type="arrow" w="sm" len="sm"/>
+          </a:ln>
+        </p:spPr>
+        <p:style>
+          <a:lnRef idx="1">
+            <a:schemeClr val="accent1"/>
+          </a:lnRef>
+          <a:fillRef idx="0">
+            <a:schemeClr val="accent1"/>
+          </a:fillRef>
+          <a:effectRef idx="0">
+            <a:schemeClr val="accent1"/>
+          </a:effectRef>
+          <a:fontRef idx="minor">
+            <a:schemeClr val="tx1"/>
+          </a:fontRef>
+        </p:style>
+      </p:cxnSp>
+      <p:sp>
+        <p:nvSpPr>
+          <p:cNvPr id="84" name="Rectangle 83"/>
+          <p:cNvSpPr/>
+          <p:nvPr/>
+        </p:nvSpPr>
+        <p:spPr>
+          <a:xfrm>
+            <a:off x="5362518" y="46396"/>
+            <a:ext cx="624094" cy="784639"/>
+          </a:xfrm>
+          <a:prstGeom prst="rect">
+            <a:avLst/>
+          </a:prstGeom>
+          <a:solidFill>
+            <a:srgbClr val="FFFFCC"/>
+          </a:solidFill>
+          <a:ln w="12700">
+            <a:solidFill>
+              <a:schemeClr val="tx1"/>
+            </a:solidFill>
+          </a:ln>
+        </p:spPr>
+        <p:style>
+          <a:lnRef idx="2">
+            <a:schemeClr val="accent1">
+              <a:shade val="50000"/>
+            </a:schemeClr>
+          </a:lnRef>
+          <a:fillRef idx="1">
+            <a:schemeClr val="accent1"/>
+          </a:fillRef>
+          <a:effectRef idx="0">
+            <a:schemeClr val="accent1"/>
+          </a:effectRef>
+          <a:fontRef idx="minor">
+            <a:schemeClr val="lt1"/>
+          </a:fontRef>
+        </p:style>
+        <p:txBody>
+          <a:bodyPr rtlCol="0" anchor="ctr"/>
+          <a:lstStyle/>
+          <a:p>
+            <a:pPr algn="ctr"/>
+            <a:r>
+              <a:rPr lang="en-US" sz="800" dirty="0" smtClean="0">
+                <a:solidFill>
+                  <a:schemeClr val="tx1"/>
+                </a:solidFill>
+                <a:latin typeface="Arial" pitchFamily="34" charset="0"/>
+                <a:cs typeface="Arial" pitchFamily="34" charset="0"/>
+              </a:rPr>
+              <a:t>Filter Decision Table</a:t>
+            </a:r>
+          </a:p>
+        </p:txBody>
+      </p:sp>
+      <p:cxnSp>
+        <p:nvCxnSpPr>
+          <p:cNvPr id="85" name="Straight Arrow Connector 84"/>
+          <p:cNvCxnSpPr/>
+          <p:nvPr/>
+        </p:nvCxnSpPr>
+        <p:spPr>
+          <a:xfrm>
+            <a:off x="5227724" y="730290"/>
+            <a:ext cx="132281" cy="0"/>
+          </a:xfrm>
+          <a:prstGeom prst="straightConnector1">
+            <a:avLst/>
+          </a:prstGeom>
+          <a:ln w="19050">
+            <a:solidFill>
+              <a:schemeClr val="tx1"/>
+            </a:solidFill>
+            <a:headEnd w="sm" len="sm"/>
+            <a:tailEnd type="arrow" w="sm" len="sm"/>
+          </a:ln>
+        </p:spPr>
+        <p:style>
+          <a:lnRef idx="1">
+            <a:schemeClr val="accent1"/>
+          </a:lnRef>
+          <a:fillRef idx="0">
+            <a:schemeClr val="accent1"/>
+          </a:fillRef>
+          <a:effectRef idx="0">
+            <a:schemeClr val="accent1"/>
+          </a:effectRef>
+          <a:fontRef idx="minor">
+            <a:schemeClr val="tx1"/>
+          </a:fontRef>
+        </p:style>
+      </p:cxnSp>
+      <p:cxnSp>
+        <p:nvCxnSpPr>
+          <p:cNvPr id="89" name="Straight Arrow Connector 88"/>
+          <p:cNvCxnSpPr/>
+          <p:nvPr/>
+        </p:nvCxnSpPr>
+        <p:spPr>
+          <a:xfrm>
+            <a:off x="5984146" y="365874"/>
+            <a:ext cx="385400" cy="0"/>
+          </a:xfrm>
+          <a:prstGeom prst="straightConnector1">
+            <a:avLst/>
+          </a:prstGeom>
+          <a:ln w="19050">
+            <a:solidFill>
+              <a:schemeClr val="tx1"/>
+            </a:solidFill>
+            <a:headEnd w="sm" len="sm"/>
+            <a:tailEnd type="arrow" w="sm" len="sm"/>
+          </a:ln>
+        </p:spPr>
+        <p:style>
+          <a:lnRef idx="1">
+            <a:schemeClr val="accent1"/>
+          </a:lnRef>
+          <a:fillRef idx="0">
+            <a:schemeClr val="accent1"/>
+          </a:fillRef>
+          <a:effectRef idx="0">
+            <a:schemeClr val="accent1"/>
+          </a:effectRef>
+          <a:fontRef idx="minor">
+            <a:schemeClr val="tx1"/>
+          </a:fontRef>
+        </p:style>
+      </p:cxnSp>
+      <p:sp>
+        <p:nvSpPr>
+          <p:cNvPr id="90" name="TextBox 89"/>
+          <p:cNvSpPr txBox="1"/>
+          <p:nvPr/>
+        </p:nvSpPr>
+        <p:spPr>
+          <a:xfrm>
+            <a:off x="5868931" y="429749"/>
+            <a:ext cx="557489" cy="215444"/>
+          </a:xfrm>
+          <a:prstGeom prst="rect">
+            <a:avLst/>
+          </a:prstGeom>
+          <a:noFill/>
+        </p:spPr>
+        <p:txBody>
+          <a:bodyPr wrap="square" rtlCol="0">
+            <a:spAutoFit/>
+          </a:bodyPr>
+          <a:lstStyle/>
+          <a:p>
+            <a:pPr algn="ctr"/>
+            <a:r>
+              <a:rPr lang="en-US" sz="800" dirty="0" smtClean="0">
+                <a:latin typeface="Arial" pitchFamily="34" charset="0"/>
+                <a:cs typeface="Arial" pitchFamily="34" charset="0"/>
+              </a:rPr>
+              <a:t>filter</a:t>
+            </a:r>
+          </a:p>
+        </p:txBody>
+      </p:sp>
+      <p:sp>
+        <p:nvSpPr>
+          <p:cNvPr id="91" name="TextBox 90"/>
+          <p:cNvSpPr txBox="1"/>
+          <p:nvPr/>
+        </p:nvSpPr>
+        <p:spPr>
+          <a:xfrm>
+            <a:off x="1269761" y="831035"/>
+            <a:ext cx="1603580" cy="215444"/>
+          </a:xfrm>
+          <a:prstGeom prst="rect">
+            <a:avLst/>
+          </a:prstGeom>
+          <a:noFill/>
+        </p:spPr>
+        <p:txBody>
+          <a:bodyPr wrap="square" rtlCol="0">
+            <a:spAutoFit/>
+          </a:bodyPr>
+          <a:lstStyle/>
+          <a:p>
+            <a:pPr algn="r"/>
+            <a:r>
+              <a:rPr lang="en-US" sz="800" dirty="0" smtClean="0">
+                <a:latin typeface="Arial" pitchFamily="34" charset="0"/>
+                <a:cs typeface="Arial" pitchFamily="34" charset="0"/>
+              </a:rPr>
+              <a:t>Source 1 Address Calculation</a:t>
+            </a:r>
+            <a:endParaRPr lang="en-US" sz="800" dirty="0">
+              <a:latin typeface="Arial" pitchFamily="34" charset="0"/>
+              <a:cs typeface="Arial" pitchFamily="34" charset="0"/>
+            </a:endParaRPr>
+          </a:p>
+        </p:txBody>
+      </p:sp>
+      <p:cxnSp>
+        <p:nvCxnSpPr>
+          <p:cNvPr id="106" name="Straight Arrow Connector 105"/>
+          <p:cNvCxnSpPr/>
+          <p:nvPr/>
+        </p:nvCxnSpPr>
+        <p:spPr>
+          <a:xfrm>
+            <a:off x="5984146" y="771883"/>
+            <a:ext cx="165003" cy="929"/>
+          </a:xfrm>
+          <a:prstGeom prst="straightConnector1">
+            <a:avLst/>
+          </a:prstGeom>
+          <a:ln w="19050">
+            <a:solidFill>
+              <a:schemeClr val="tx1"/>
+            </a:solidFill>
+            <a:headEnd w="sm" len="sm"/>
+            <a:tailEnd type="none" w="sm" len="sm"/>
+          </a:ln>
+        </p:spPr>
+        <p:style>
+          <a:lnRef idx="1">
+            <a:schemeClr val="accent1"/>
+          </a:lnRef>
+          <a:fillRef idx="0">
+            <a:schemeClr val="accent1"/>
+          </a:fillRef>
+          <a:effectRef idx="0">
+            <a:schemeClr val="accent1"/>
+          </a:effectRef>
+          <a:fontRef idx="minor">
+            <a:schemeClr val="tx1"/>
+          </a:fontRef>
+        </p:style>
+      </p:cxnSp>
+      <p:cxnSp>
+        <p:nvCxnSpPr>
+          <p:cNvPr id="107" name="Straight Arrow Connector 106"/>
+          <p:cNvCxnSpPr/>
+          <p:nvPr/>
+        </p:nvCxnSpPr>
+        <p:spPr>
+          <a:xfrm>
+            <a:off x="6147675" y="771883"/>
+            <a:ext cx="1474" cy="210523"/>
+          </a:xfrm>
+          <a:prstGeom prst="straightConnector1">
+            <a:avLst/>
+          </a:prstGeom>
+          <a:ln w="19050">
+            <a:solidFill>
+              <a:schemeClr val="tx1"/>
+            </a:solidFill>
+            <a:headEnd w="sm" len="sm"/>
+            <a:tailEnd type="none" w="sm" len="sm"/>
+          </a:ln>
+        </p:spPr>
+        <p:style>
+          <a:lnRef idx="1">
+            <a:schemeClr val="accent1"/>
+          </a:lnRef>
+          <a:fillRef idx="0">
+            <a:schemeClr val="accent1"/>
+          </a:fillRef>
+          <a:effectRef idx="0">
+            <a:schemeClr val="accent1"/>
+          </a:effectRef>
+          <a:fontRef idx="minor">
+            <a:schemeClr val="tx1"/>
+          </a:fontRef>
+        </p:style>
+      </p:cxnSp>
+      <p:sp>
+        <p:nvSpPr>
+          <p:cNvPr id="115" name="TextBox 114"/>
+          <p:cNvSpPr txBox="1"/>
+          <p:nvPr/>
+        </p:nvSpPr>
+        <p:spPr>
+          <a:xfrm>
+            <a:off x="5456007" y="953099"/>
+            <a:ext cx="758569" cy="215444"/>
+          </a:xfrm>
+          <a:prstGeom prst="rect">
+            <a:avLst/>
+          </a:prstGeom>
+          <a:noFill/>
+        </p:spPr>
+        <p:txBody>
+          <a:bodyPr wrap="square" rtlCol="0">
+            <a:spAutoFit/>
+          </a:bodyPr>
+          <a:lstStyle/>
+          <a:p>
+            <a:pPr algn="ctr"/>
+            <a:r>
+              <a:rPr lang="en-US" sz="800" dirty="0" smtClean="0">
+                <a:latin typeface="Arial" pitchFamily="34" charset="0"/>
+                <a:cs typeface="Arial" pitchFamily="34" charset="0"/>
+              </a:rPr>
+              <a:t>write enable</a:t>
+            </a:r>
+          </a:p>
+        </p:txBody>
+      </p:sp>
+      <p:cxnSp>
+        <p:nvCxnSpPr>
+          <p:cNvPr id="116" name="Straight Arrow Connector 115"/>
+          <p:cNvCxnSpPr/>
+          <p:nvPr/>
+        </p:nvCxnSpPr>
+        <p:spPr>
+          <a:xfrm>
+            <a:off x="2774157" y="601579"/>
+            <a:ext cx="790474" cy="0"/>
+          </a:xfrm>
+          <a:prstGeom prst="straightConnector1">
+            <a:avLst/>
+          </a:prstGeom>
+          <a:ln w="19050">
+            <a:solidFill>
+              <a:schemeClr val="tx1"/>
+            </a:solidFill>
+            <a:headEnd w="sm" len="sm"/>
+            <a:tailEnd type="arrow" w="sm" len="sm"/>
+          </a:ln>
+        </p:spPr>
+        <p:style>
+          <a:lnRef idx="1">
+            <a:schemeClr val="accent1"/>
+          </a:lnRef>
+          <a:fillRef idx="0">
+            <a:schemeClr val="accent1"/>
+          </a:fillRef>
+          <a:effectRef idx="0">
+            <a:schemeClr val="accent1"/>
+          </a:effectRef>
+          <a:fontRef idx="minor">
+            <a:schemeClr val="tx1"/>
+          </a:fontRef>
+        </p:style>
+      </p:cxnSp>
+      <p:sp>
+        <p:nvSpPr>
+          <p:cNvPr id="70" name="TextBox 69"/>
+          <p:cNvSpPr txBox="1"/>
+          <p:nvPr/>
+        </p:nvSpPr>
+        <p:spPr>
+          <a:xfrm>
+            <a:off x="2911746" y="211047"/>
+            <a:ext cx="691290" cy="215444"/>
+          </a:xfrm>
+          <a:prstGeom prst="rect">
+            <a:avLst/>
+          </a:prstGeom>
+          <a:noFill/>
+        </p:spPr>
+        <p:txBody>
+          <a:bodyPr wrap="square" rtlCol="0">
+            <a:spAutoFit/>
+          </a:bodyPr>
+          <a:lstStyle/>
+          <a:p>
+            <a:pPr algn="r"/>
+            <a:r>
+              <a:rPr lang="en-US" sz="800" dirty="0" err="1" smtClean="0">
+                <a:latin typeface="Arial" pitchFamily="34" charset="0"/>
+                <a:cs typeface="Arial" pitchFamily="34" charset="0"/>
+              </a:rPr>
+              <a:t>rd</a:t>
+            </a:r>
+            <a:r>
+              <a:rPr lang="en-US" sz="800" dirty="0" smtClean="0">
+                <a:latin typeface="Arial" pitchFamily="34" charset="0"/>
+                <a:cs typeface="Arial" pitchFamily="34" charset="0"/>
+              </a:rPr>
+              <a:t> </a:t>
+            </a:r>
+            <a:r>
+              <a:rPr lang="en-US" sz="800" dirty="0" err="1" smtClean="0">
+                <a:latin typeface="Arial" pitchFamily="34" charset="0"/>
+                <a:cs typeface="Arial" pitchFamily="34" charset="0"/>
+              </a:rPr>
+              <a:t>addr</a:t>
+            </a:r>
+            <a:r>
+              <a:rPr lang="en-US" sz="800" dirty="0" smtClean="0">
+                <a:latin typeface="Arial" pitchFamily="34" charset="0"/>
+                <a:cs typeface="Arial" pitchFamily="34" charset="0"/>
+              </a:rPr>
+              <a:t> 0</a:t>
+            </a:r>
+            <a:endParaRPr lang="en-US" sz="800" dirty="0">
+              <a:latin typeface="Arial" pitchFamily="34" charset="0"/>
+              <a:cs typeface="Arial" pitchFamily="34" charset="0"/>
+            </a:endParaRPr>
+          </a:p>
+        </p:txBody>
+      </p:sp>
+      <p:sp>
+        <p:nvSpPr>
+          <p:cNvPr id="74" name="TextBox 73"/>
+          <p:cNvSpPr txBox="1"/>
+          <p:nvPr/>
+        </p:nvSpPr>
+        <p:spPr>
+          <a:xfrm>
+            <a:off x="2930948" y="409916"/>
+            <a:ext cx="672088" cy="215444"/>
+          </a:xfrm>
+          <a:prstGeom prst="rect">
+            <a:avLst/>
+          </a:prstGeom>
+          <a:noFill/>
+        </p:spPr>
+        <p:txBody>
+          <a:bodyPr wrap="square" rtlCol="0">
+            <a:spAutoFit/>
+          </a:bodyPr>
+          <a:lstStyle/>
+          <a:p>
+            <a:pPr algn="r"/>
+            <a:r>
+              <a:rPr lang="en-US" sz="800" dirty="0" err="1" smtClean="0">
+                <a:latin typeface="Arial" pitchFamily="34" charset="0"/>
+                <a:cs typeface="Arial" pitchFamily="34" charset="0"/>
+              </a:rPr>
+              <a:t>rd</a:t>
+            </a:r>
+            <a:r>
+              <a:rPr lang="en-US" sz="800" dirty="0" smtClean="0">
+                <a:latin typeface="Arial" pitchFamily="34" charset="0"/>
+                <a:cs typeface="Arial" pitchFamily="34" charset="0"/>
+              </a:rPr>
+              <a:t> </a:t>
+            </a:r>
+            <a:r>
+              <a:rPr lang="en-US" sz="800" dirty="0" err="1" smtClean="0">
+                <a:latin typeface="Arial" pitchFamily="34" charset="0"/>
+                <a:cs typeface="Arial" pitchFamily="34" charset="0"/>
+              </a:rPr>
+              <a:t>addr</a:t>
+            </a:r>
+            <a:r>
+              <a:rPr lang="en-US" sz="800" dirty="0" smtClean="0">
+                <a:latin typeface="Arial" pitchFamily="34" charset="0"/>
+                <a:cs typeface="Arial" pitchFamily="34" charset="0"/>
+              </a:rPr>
+              <a:t> 1</a:t>
+            </a:r>
+            <a:endParaRPr lang="en-US" sz="800" dirty="0">
+              <a:latin typeface="Arial" pitchFamily="34" charset="0"/>
+              <a:cs typeface="Arial" pitchFamily="34" charset="0"/>
+            </a:endParaRPr>
+          </a:p>
+        </p:txBody>
+      </p:sp>
+      <p:cxnSp>
+        <p:nvCxnSpPr>
+          <p:cNvPr id="79" name="Straight Arrow Connector 78"/>
+          <p:cNvCxnSpPr/>
+          <p:nvPr/>
+        </p:nvCxnSpPr>
+        <p:spPr>
+          <a:xfrm>
+            <a:off x="4746664" y="428810"/>
+            <a:ext cx="615854" cy="0"/>
+          </a:xfrm>
+          <a:prstGeom prst="straightConnector1">
+            <a:avLst/>
+          </a:prstGeom>
+          <a:ln w="19050">
+            <a:solidFill>
+              <a:schemeClr val="tx1"/>
+            </a:solidFill>
+            <a:headEnd w="sm" len="sm"/>
+            <a:tailEnd type="arrow" w="sm" len="sm"/>
+          </a:ln>
+        </p:spPr>
+        <p:style>
+          <a:lnRef idx="1">
+            <a:schemeClr val="accent1"/>
+          </a:lnRef>
+          <a:fillRef idx="0">
+            <a:schemeClr val="accent1"/>
+          </a:fillRef>
+          <a:effectRef idx="0">
+            <a:schemeClr val="accent1"/>
+          </a:effectRef>
+          <a:fontRef idx="minor">
+            <a:schemeClr val="tx1"/>
+          </a:fontRef>
+        </p:style>
+      </p:cxnSp>
+      <p:sp>
+        <p:nvSpPr>
+          <p:cNvPr id="77" name="TextBox 76"/>
+          <p:cNvSpPr txBox="1"/>
+          <p:nvPr/>
+        </p:nvSpPr>
+        <p:spPr>
+          <a:xfrm>
+            <a:off x="876282" y="425540"/>
+            <a:ext cx="711108" cy="215444"/>
+          </a:xfrm>
+          <a:prstGeom prst="rect">
+            <a:avLst/>
+          </a:prstGeom>
+          <a:noFill/>
+        </p:spPr>
+        <p:txBody>
+          <a:bodyPr wrap="square" rtlCol="0">
+            <a:spAutoFit/>
+          </a:bodyPr>
+          <a:lstStyle/>
+          <a:p>
+            <a:pPr algn="r"/>
+            <a:r>
+              <a:rPr lang="en-US" sz="800" dirty="0" smtClean="0">
+                <a:latin typeface="Arial" pitchFamily="34" charset="0"/>
+                <a:cs typeface="Arial" pitchFamily="34" charset="0"/>
+              </a:rPr>
+              <a:t>Constant</a:t>
+            </a:r>
+          </a:p>
+        </p:txBody>
+      </p:sp>
+      <p:cxnSp>
+        <p:nvCxnSpPr>
+          <p:cNvPr id="83" name="Straight Arrow Connector 82"/>
+          <p:cNvCxnSpPr/>
+          <p:nvPr/>
+        </p:nvCxnSpPr>
+        <p:spPr>
+          <a:xfrm>
+            <a:off x="5984146" y="672216"/>
+            <a:ext cx="270840" cy="0"/>
+          </a:xfrm>
+          <a:prstGeom prst="straightConnector1">
+            <a:avLst/>
+          </a:prstGeom>
+          <a:ln w="19050">
+            <a:solidFill>
+              <a:schemeClr val="tx1"/>
+            </a:solidFill>
+            <a:headEnd w="sm" len="sm"/>
+            <a:tailEnd type="none" w="sm" len="sm"/>
+          </a:ln>
+        </p:spPr>
+        <p:style>
+          <a:lnRef idx="1">
+            <a:schemeClr val="accent1"/>
+          </a:lnRef>
+          <a:fillRef idx="0">
+            <a:schemeClr val="accent1"/>
+          </a:fillRef>
+          <a:effectRef idx="0">
+            <a:schemeClr val="accent1"/>
+          </a:effectRef>
+          <a:fontRef idx="minor">
+            <a:schemeClr val="tx1"/>
+          </a:fontRef>
+        </p:style>
+      </p:cxnSp>
+      <p:cxnSp>
+        <p:nvCxnSpPr>
+          <p:cNvPr id="88" name="Straight Arrow Connector 87"/>
+          <p:cNvCxnSpPr/>
+          <p:nvPr/>
+        </p:nvCxnSpPr>
+        <p:spPr>
+          <a:xfrm>
+            <a:off x="6254986" y="672216"/>
+            <a:ext cx="0" cy="502617"/>
+          </a:xfrm>
+          <a:prstGeom prst="straightConnector1">
+            <a:avLst/>
+          </a:prstGeom>
+          <a:ln w="19050">
+            <a:solidFill>
+              <a:schemeClr val="tx1"/>
+            </a:solidFill>
+            <a:headEnd w="sm" len="sm"/>
+            <a:tailEnd type="none" w="sm" len="sm"/>
+          </a:ln>
+        </p:spPr>
+        <p:style>
+          <a:lnRef idx="1">
+            <a:schemeClr val="accent1"/>
+          </a:lnRef>
+          <a:fillRef idx="0">
+            <a:schemeClr val="accent1"/>
+          </a:fillRef>
+          <a:effectRef idx="0">
+            <a:schemeClr val="accent1"/>
+          </a:effectRef>
+          <a:fontRef idx="minor">
+            <a:schemeClr val="tx1"/>
+          </a:fontRef>
+        </p:style>
+      </p:cxnSp>
+      <p:cxnSp>
+        <p:nvCxnSpPr>
+          <p:cNvPr id="100" name="Straight Arrow Connector 99"/>
+          <p:cNvCxnSpPr/>
+          <p:nvPr/>
+        </p:nvCxnSpPr>
+        <p:spPr>
+          <a:xfrm flipH="1">
+            <a:off x="4749182" y="1180643"/>
+            <a:ext cx="1505804" cy="0"/>
+          </a:xfrm>
+          <a:prstGeom prst="straightConnector1">
+            <a:avLst/>
+          </a:prstGeom>
+          <a:ln w="19050">
+            <a:solidFill>
+              <a:schemeClr val="tx1"/>
+            </a:solidFill>
+            <a:headEnd w="sm" len="sm"/>
+            <a:tailEnd type="arrow" w="sm" len="sm"/>
+          </a:ln>
+        </p:spPr>
+        <p:style>
+          <a:lnRef idx="1">
+            <a:schemeClr val="accent1"/>
+          </a:lnRef>
+          <a:fillRef idx="0">
+            <a:schemeClr val="accent1"/>
+          </a:fillRef>
+          <a:effectRef idx="0">
+            <a:schemeClr val="accent1"/>
+          </a:effectRef>
+          <a:fontRef idx="minor">
+            <a:schemeClr val="tx1"/>
+          </a:fontRef>
+        </p:style>
+      </p:cxnSp>
+      <p:sp>
+        <p:nvSpPr>
+          <p:cNvPr id="101" name="TextBox 100"/>
+          <p:cNvSpPr txBox="1"/>
+          <p:nvPr/>
+        </p:nvSpPr>
+        <p:spPr>
+          <a:xfrm>
+            <a:off x="5456007" y="1136026"/>
+            <a:ext cx="758569" cy="215444"/>
+          </a:xfrm>
+          <a:prstGeom prst="rect">
+            <a:avLst/>
+          </a:prstGeom>
+          <a:noFill/>
+        </p:spPr>
+        <p:txBody>
+          <a:bodyPr wrap="square" rtlCol="0">
+            <a:spAutoFit/>
+          </a:bodyPr>
+          <a:lstStyle/>
+          <a:p>
+            <a:pPr algn="ctr"/>
+            <a:r>
+              <a:rPr lang="en-US" sz="800" dirty="0" smtClean="0">
+                <a:latin typeface="Arial" pitchFamily="34" charset="0"/>
+                <a:cs typeface="Arial" pitchFamily="34" charset="0"/>
+              </a:rPr>
+              <a:t>write value</a:t>
+            </a:r>
+          </a:p>
+        </p:txBody>
+      </p:sp>
+      <p:sp>
+        <p:nvSpPr>
+          <p:cNvPr id="102" name="Rectangle 101"/>
+          <p:cNvSpPr/>
+          <p:nvPr/>
+        </p:nvSpPr>
+        <p:spPr>
+          <a:xfrm>
+            <a:off x="65234" y="41403"/>
+            <a:ext cx="562031" cy="465559"/>
+          </a:xfrm>
+          <a:prstGeom prst="rect">
+            <a:avLst/>
+          </a:prstGeom>
+          <a:solidFill>
+            <a:srgbClr val="FFFFCC"/>
+          </a:solidFill>
+          <a:ln w="12700">
+            <a:solidFill>
+              <a:schemeClr val="tx1"/>
+            </a:solidFill>
+          </a:ln>
+        </p:spPr>
+        <p:style>
+          <a:lnRef idx="2">
+            <a:schemeClr val="accent1">
+              <a:shade val="50000"/>
+            </a:schemeClr>
+          </a:lnRef>
+          <a:fillRef idx="1">
+            <a:schemeClr val="accent1"/>
+          </a:fillRef>
+          <a:effectRef idx="0">
+            <a:schemeClr val="accent1"/>
+          </a:effectRef>
+          <a:fontRef idx="minor">
+            <a:schemeClr val="lt1"/>
+          </a:fontRef>
+        </p:style>
+        <p:txBody>
+          <a:bodyPr rtlCol="0" anchor="ctr"/>
+          <a:lstStyle/>
+          <a:p>
+            <a:pPr algn="ctr"/>
+            <a:r>
+              <a:rPr lang="en-US" sz="800" dirty="0" smtClean="0">
+                <a:solidFill>
+                  <a:schemeClr val="tx1"/>
+                </a:solidFill>
+                <a:latin typeface="Arial" pitchFamily="34" charset="0"/>
+                <a:cs typeface="Arial" pitchFamily="34" charset="0"/>
+              </a:rPr>
+              <a:t>FIFO entry</a:t>
+            </a:r>
+          </a:p>
+        </p:txBody>
+      </p:sp>
+      <p:sp>
+        <p:nvSpPr>
+          <p:cNvPr id="103" name="Rectangle 102"/>
+          <p:cNvSpPr/>
+          <p:nvPr/>
+        </p:nvSpPr>
+        <p:spPr>
+          <a:xfrm>
+            <a:off x="65234" y="744750"/>
+            <a:ext cx="562031" cy="415896"/>
+          </a:xfrm>
+          <a:prstGeom prst="rect">
+            <a:avLst/>
+          </a:prstGeom>
+          <a:solidFill>
+            <a:srgbClr val="FFFFCC"/>
+          </a:solidFill>
+          <a:ln w="12700">
+            <a:solidFill>
+              <a:schemeClr val="tx1"/>
+            </a:solidFill>
+          </a:ln>
+        </p:spPr>
+        <p:style>
+          <a:lnRef idx="2">
+            <a:schemeClr val="accent1">
+              <a:shade val="50000"/>
+            </a:schemeClr>
+          </a:lnRef>
+          <a:fillRef idx="1">
+            <a:schemeClr val="accent1"/>
+          </a:fillRef>
+          <a:effectRef idx="0">
+            <a:schemeClr val="accent1"/>
+          </a:effectRef>
+          <a:fontRef idx="minor">
+            <a:schemeClr val="lt1"/>
+          </a:fontRef>
+        </p:style>
+        <p:txBody>
+          <a:bodyPr rtlCol="0" anchor="ctr"/>
+          <a:lstStyle/>
+          <a:p>
+            <a:pPr algn="ctr"/>
+            <a:r>
+              <a:rPr lang="en-US" sz="800" dirty="0" err="1" smtClean="0">
+                <a:solidFill>
+                  <a:schemeClr val="tx1"/>
+                </a:solidFill>
+                <a:latin typeface="Arial" pitchFamily="34" charset="0"/>
+                <a:cs typeface="Arial" pitchFamily="34" charset="0"/>
+              </a:rPr>
+              <a:t>Config</a:t>
+            </a:r>
+            <a:r>
+              <a:rPr lang="en-US" sz="800" dirty="0" smtClean="0">
+                <a:solidFill>
+                  <a:schemeClr val="tx1"/>
+                </a:solidFill>
+                <a:latin typeface="Arial" pitchFamily="34" charset="0"/>
+                <a:cs typeface="Arial" pitchFamily="34" charset="0"/>
+              </a:rPr>
+              <a:t> Table</a:t>
+            </a:r>
+          </a:p>
+        </p:txBody>
+      </p:sp>
+      <p:cxnSp>
+        <p:nvCxnSpPr>
+          <p:cNvPr id="105" name="Straight Arrow Connector 104"/>
+          <p:cNvCxnSpPr>
+            <a:stCxn id="102" idx="3"/>
+          </p:cNvCxnSpPr>
+          <p:nvPr/>
+        </p:nvCxnSpPr>
+        <p:spPr>
+          <a:xfrm flipV="1">
+            <a:off x="627265" y="274182"/>
+            <a:ext cx="179283" cy="1"/>
+          </a:xfrm>
+          <a:prstGeom prst="straightConnector1">
+            <a:avLst/>
+          </a:prstGeom>
+          <a:ln w="19050">
+            <a:solidFill>
+              <a:schemeClr val="tx1"/>
+            </a:solidFill>
+            <a:headEnd w="sm" len="sm"/>
+            <a:tailEnd type="arrow" w="sm" len="sm"/>
+          </a:ln>
+        </p:spPr>
+        <p:style>
+          <a:lnRef idx="1">
+            <a:schemeClr val="accent1"/>
+          </a:lnRef>
+          <a:fillRef idx="0">
+            <a:schemeClr val="accent1"/>
+          </a:fillRef>
+          <a:effectRef idx="0">
+            <a:schemeClr val="accent1"/>
+          </a:effectRef>
+          <a:fontRef idx="minor">
+            <a:schemeClr val="tx1"/>
+          </a:fontRef>
+        </p:style>
+      </p:cxnSp>
+      <p:cxnSp>
+        <p:nvCxnSpPr>
+          <p:cNvPr id="108" name="Straight Arrow Connector 107"/>
+          <p:cNvCxnSpPr/>
+          <p:nvPr/>
+        </p:nvCxnSpPr>
+        <p:spPr>
+          <a:xfrm>
+            <a:off x="627265" y="800550"/>
+            <a:ext cx="179285" cy="403"/>
+          </a:xfrm>
+          <a:prstGeom prst="straightConnector1">
+            <a:avLst/>
+          </a:prstGeom>
+          <a:ln w="19050">
+            <a:solidFill>
+              <a:schemeClr val="tx1"/>
+            </a:solidFill>
+            <a:headEnd w="sm" len="sm"/>
+            <a:tailEnd type="arrow" w="sm" len="sm"/>
+          </a:ln>
+        </p:spPr>
+        <p:style>
+          <a:lnRef idx="1">
+            <a:schemeClr val="accent1"/>
+          </a:lnRef>
+          <a:fillRef idx="0">
+            <a:schemeClr val="accent1"/>
+          </a:fillRef>
+          <a:effectRef idx="0">
+            <a:schemeClr val="accent1"/>
+          </a:effectRef>
+          <a:fontRef idx="minor">
+            <a:schemeClr val="tx1"/>
+          </a:fontRef>
+        </p:style>
+      </p:cxnSp>
+      <p:cxnSp>
+        <p:nvCxnSpPr>
+          <p:cNvPr id="109" name="Straight Arrow Connector 108"/>
+          <p:cNvCxnSpPr/>
+          <p:nvPr/>
+        </p:nvCxnSpPr>
+        <p:spPr>
+          <a:xfrm>
+            <a:off x="166407" y="510436"/>
+            <a:ext cx="0" cy="234047"/>
+          </a:xfrm>
+          <a:prstGeom prst="straightConnector1">
+            <a:avLst/>
+          </a:prstGeom>
+          <a:ln w="19050">
+            <a:solidFill>
+              <a:schemeClr val="tx1"/>
+            </a:solidFill>
+            <a:headEnd w="sm" len="sm"/>
+            <a:tailEnd type="arrow" w="sm" len="sm"/>
+          </a:ln>
+        </p:spPr>
+        <p:style>
+          <a:lnRef idx="1">
+            <a:schemeClr val="accent1"/>
+          </a:lnRef>
+          <a:fillRef idx="0">
+            <a:schemeClr val="accent1"/>
+          </a:fillRef>
+          <a:effectRef idx="0">
+            <a:schemeClr val="accent1"/>
+          </a:effectRef>
+          <a:fontRef idx="minor">
+            <a:schemeClr val="tx1"/>
+          </a:fontRef>
+        </p:style>
+      </p:cxnSp>
+      <p:sp>
+        <p:nvSpPr>
+          <p:cNvPr id="110" name="TextBox 109"/>
+          <p:cNvSpPr txBox="1"/>
+          <p:nvPr/>
+        </p:nvSpPr>
+        <p:spPr>
+          <a:xfrm>
+            <a:off x="133116" y="514304"/>
+            <a:ext cx="652886" cy="215444"/>
+          </a:xfrm>
+          <a:prstGeom prst="rect">
+            <a:avLst/>
+          </a:prstGeom>
+          <a:noFill/>
+        </p:spPr>
+        <p:txBody>
+          <a:bodyPr wrap="square" rtlCol="0">
+            <a:spAutoFit/>
+          </a:bodyPr>
+          <a:lstStyle/>
+          <a:p>
+            <a:r>
+              <a:rPr lang="en-US" sz="800" dirty="0" err="1">
+                <a:latin typeface="Arial" pitchFamily="34" charset="0"/>
+                <a:cs typeface="Arial" pitchFamily="34" charset="0"/>
+              </a:rPr>
+              <a:t>i</a:t>
+            </a:r>
+            <a:r>
+              <a:rPr lang="en-US" sz="800" dirty="0" err="1" smtClean="0">
+                <a:latin typeface="Arial" pitchFamily="34" charset="0"/>
+                <a:cs typeface="Arial" pitchFamily="34" charset="0"/>
+              </a:rPr>
+              <a:t>nst</a:t>
+            </a:r>
+            <a:r>
+              <a:rPr lang="en-US" sz="800" dirty="0" smtClean="0">
+                <a:latin typeface="Arial" pitchFamily="34" charset="0"/>
+                <a:cs typeface="Arial" pitchFamily="34" charset="0"/>
+              </a:rPr>
+              <a:t> type</a:t>
+            </a:r>
+            <a:endParaRPr lang="en-US" sz="800" dirty="0">
+              <a:latin typeface="Arial" pitchFamily="34" charset="0"/>
+              <a:cs typeface="Arial" pitchFamily="34" charset="0"/>
+            </a:endParaRPr>
+          </a:p>
+        </p:txBody>
+      </p:sp>
+      <p:cxnSp>
+        <p:nvCxnSpPr>
+          <p:cNvPr id="111" name="Straight Arrow Connector 110"/>
+          <p:cNvCxnSpPr/>
+          <p:nvPr/>
+        </p:nvCxnSpPr>
+        <p:spPr>
+          <a:xfrm flipH="1">
+            <a:off x="4749181" y="982406"/>
+            <a:ext cx="1399968" cy="0"/>
+          </a:xfrm>
+          <a:prstGeom prst="straightConnector1">
+            <a:avLst/>
+          </a:prstGeom>
+          <a:ln w="19050">
+            <a:solidFill>
+              <a:schemeClr val="tx1"/>
+            </a:solidFill>
+            <a:headEnd w="sm" len="sm"/>
+            <a:tailEnd type="arrow" w="sm" len="sm"/>
+          </a:ln>
+        </p:spPr>
+        <p:style>
+          <a:lnRef idx="1">
+            <a:schemeClr val="accent1"/>
+          </a:lnRef>
+          <a:fillRef idx="0">
+            <a:schemeClr val="accent1"/>
+          </a:fillRef>
+          <a:effectRef idx="0">
+            <a:schemeClr val="accent1"/>
+          </a:effectRef>
+          <a:fontRef idx="minor">
+            <a:schemeClr val="tx1"/>
+          </a:fontRef>
+        </p:style>
+      </p:cxnSp>
+      <p:cxnSp>
+        <p:nvCxnSpPr>
+          <p:cNvPr id="129" name="Straight Arrow Connector 128"/>
+          <p:cNvCxnSpPr/>
+          <p:nvPr/>
+        </p:nvCxnSpPr>
+        <p:spPr>
+          <a:xfrm flipV="1">
+            <a:off x="624475" y="952698"/>
+            <a:ext cx="348435" cy="252"/>
+          </a:xfrm>
+          <a:prstGeom prst="straightConnector1">
+            <a:avLst/>
+          </a:prstGeom>
+          <a:ln w="19050">
+            <a:solidFill>
+              <a:schemeClr val="tx1"/>
+            </a:solidFill>
+            <a:headEnd w="sm" len="sm"/>
+            <a:tailEnd type="arrow" w="sm" len="sm"/>
+          </a:ln>
+        </p:spPr>
+        <p:style>
+          <a:lnRef idx="1">
+            <a:schemeClr val="accent1"/>
+          </a:lnRef>
+          <a:fillRef idx="0">
+            <a:schemeClr val="accent1"/>
+          </a:fillRef>
+          <a:effectRef idx="0">
+            <a:schemeClr val="accent1"/>
+          </a:effectRef>
+          <a:fontRef idx="minor">
+            <a:schemeClr val="tx1"/>
+          </a:fontRef>
+        </p:style>
+      </p:cxnSp>
+      <p:cxnSp>
+        <p:nvCxnSpPr>
+          <p:cNvPr id="130" name="Straight Arrow Connector 129"/>
+          <p:cNvCxnSpPr/>
+          <p:nvPr/>
+        </p:nvCxnSpPr>
+        <p:spPr>
+          <a:xfrm flipV="1">
+            <a:off x="634360" y="1105350"/>
+            <a:ext cx="559420" cy="252"/>
+          </a:xfrm>
+          <a:prstGeom prst="straightConnector1">
+            <a:avLst/>
+          </a:prstGeom>
+          <a:ln w="19050">
+            <a:solidFill>
+              <a:schemeClr val="tx1"/>
+            </a:solidFill>
+            <a:headEnd w="sm" len="sm"/>
+            <a:tailEnd type="arrow" w="sm" len="sm"/>
+          </a:ln>
+        </p:spPr>
+        <p:style>
+          <a:lnRef idx="1">
+            <a:schemeClr val="accent1"/>
+          </a:lnRef>
+          <a:fillRef idx="0">
+            <a:schemeClr val="accent1"/>
+          </a:fillRef>
+          <a:effectRef idx="0">
+            <a:schemeClr val="accent1"/>
+          </a:effectRef>
+          <a:fontRef idx="minor">
+            <a:schemeClr val="tx1"/>
+          </a:fontRef>
+        </p:style>
+      </p:cxnSp>
+    </p:spTree>
+    <p:extLst>
+      <p:ext uri="{BB962C8B-B14F-4D97-AF65-F5344CB8AC3E}">
+        <p14:creationId xmlns:p14="http://schemas.microsoft.com/office/powerpoint/2010/main" val="1839733479"/>
+      </p:ext>
+    </p:extLst>
+  </p:cSld>
+  <p:clrMapOvr>
+    <a:masterClrMapping/>
+  </p:clrMapOvr>
+</p:sld>
+</file>
+
+<file path=ppt/slides/slide3.xml><?xml version="1.0" encoding="utf-8"?>
+<p:sld xmlns:a="http://schemas.openxmlformats.org/drawingml/2006/main" xmlns:r="http://schemas.openxmlformats.org/officeDocument/2006/relationships" xmlns:p="http://schemas.openxmlformats.org/presentationml/2006/main">
+  <p:cSld>
+    <p:spTree>
+      <p:nvGrpSpPr>
+        <p:cNvPr id="1" name=""/>
+        <p:cNvGrpSpPr/>
+        <p:nvPr/>
+      </p:nvGrpSpPr>
+      <p:grpSpPr>
+        <a:xfrm>
+          <a:off x="0" y="0"/>
+          <a:ext cx="0" cy="0"/>
+          <a:chOff x="0" y="0"/>
+          <a:chExt cx="0" cy="0"/>
+        </a:xfrm>
+      </p:grpSpPr>
+      <p:sp>
+        <p:nvSpPr>
+          <p:cNvPr id="5" name="TextBox 4"/>
+          <p:cNvSpPr txBox="1"/>
+          <p:nvPr/>
+        </p:nvSpPr>
+        <p:spPr>
+          <a:xfrm>
+            <a:off x="32529" y="164543"/>
+            <a:ext cx="1746885" cy="1384995"/>
+          </a:xfrm>
+          <a:prstGeom prst="rect">
+            <a:avLst/>
+          </a:prstGeom>
+          <a:noFill/>
+        </p:spPr>
+        <p:txBody>
+          <a:bodyPr wrap="square" rtlCol="0">
+            <a:spAutoFit/>
+          </a:bodyPr>
+          <a:lstStyle/>
+          <a:p>
             <a:r>
               <a:rPr lang="en-US" sz="600" dirty="0" smtClean="0">
                 <a:latin typeface="Consolas" pitchFamily="49" charset="0"/>
@@ -6576,29 +9454,19 @@
                 <a:latin typeface="Consolas" pitchFamily="49" charset="0"/>
                 <a:cs typeface="Consolas" pitchFamily="49" charset="0"/>
               </a:rPr>
-              <a:t>[1] = </a:t>
-            </a:r>
+              <a:t>[1] = {r1, r1 + 0xf}</a:t>
+            </a:r>
+          </a:p>
+          <a:p>
             <a:r>
               <a:rPr lang="en-US" sz="600" dirty="0" smtClean="0">
                 <a:latin typeface="Consolas" pitchFamily="49" charset="0"/>
                 <a:cs typeface="Consolas" pitchFamily="49" charset="0"/>
               </a:rPr>
-              <a:t>{r1, r1 </a:t>
-            </a:r>
-            <a:r>
-              <a:rPr lang="en-US" sz="600" dirty="0" smtClean="0">
-                <a:latin typeface="Consolas" pitchFamily="49" charset="0"/>
-                <a:cs typeface="Consolas" pitchFamily="49" charset="0"/>
-              </a:rPr>
-              <a:t>+ </a:t>
-            </a:r>
-            <a:r>
-              <a:rPr lang="en-US" sz="600" dirty="0" smtClean="0">
-                <a:latin typeface="Consolas" pitchFamily="49" charset="0"/>
-                <a:cs typeface="Consolas" pitchFamily="49" charset="0"/>
-              </a:rPr>
-              <a:t>0xf}</a:t>
-            </a:r>
+              <a:t>     // {base, bounds} of array</a:t>
+            </a:r>
+          </a:p>
+          <a:p>
             <a:endParaRPr lang="en-US" sz="600" dirty="0" smtClean="0">
               <a:latin typeface="Consolas" pitchFamily="49" charset="0"/>
               <a:cs typeface="Consolas" pitchFamily="49" charset="0"/>
@@ -6610,32 +9478,6 @@
                 <a:latin typeface="Consolas" pitchFamily="49" charset="0"/>
                 <a:cs typeface="Consolas" pitchFamily="49" charset="0"/>
               </a:rPr>
-              <a:t>     // </a:t>
-            </a:r>
-            <a:r>
-              <a:rPr lang="en-US" sz="600" dirty="0" smtClean="0">
-                <a:latin typeface="Consolas" pitchFamily="49" charset="0"/>
-                <a:cs typeface="Consolas" pitchFamily="49" charset="0"/>
-              </a:rPr>
-              <a:t>{base, bounds} of array</a:t>
-            </a:r>
-            <a:endParaRPr lang="en-US" sz="600" dirty="0" smtClean="0">
-              <a:latin typeface="Consolas" pitchFamily="49" charset="0"/>
-              <a:cs typeface="Consolas" pitchFamily="49" charset="0"/>
-            </a:endParaRPr>
-          </a:p>
-          <a:p>
-            <a:endParaRPr lang="en-US" sz="600" dirty="0" smtClean="0">
-              <a:latin typeface="Consolas" pitchFamily="49" charset="0"/>
-              <a:cs typeface="Consolas" pitchFamily="49" charset="0"/>
-            </a:endParaRPr>
-          </a:p>
-          <a:p>
-            <a:r>
-              <a:rPr lang="en-US" sz="600" dirty="0" smtClean="0">
-                <a:latin typeface="Consolas" pitchFamily="49" charset="0"/>
-                <a:cs typeface="Consolas" pitchFamily="49" charset="0"/>
-              </a:rPr>
               <a:t>2: </a:t>
             </a:r>
             <a:r>
@@ -6708,14 +9550,37 @@
                 <a:latin typeface="Consolas" pitchFamily="49" charset="0"/>
                 <a:cs typeface="Consolas" pitchFamily="49" charset="0"/>
               </a:rPr>
-              <a:t>3b: if (r1 + 12 &lt; </a:t>
+              <a:t>3b: if (r1 + 12 &lt; base(</a:t>
+            </a:r>
+            <a:r>
+              <a:rPr lang="en-US" sz="600" dirty="0" err="1" smtClean="0">
+                <a:latin typeface="Consolas" pitchFamily="49" charset="0"/>
+                <a:cs typeface="Consolas" pitchFamily="49" charset="0"/>
+              </a:rPr>
+              <a:t>rf_metadata</a:t>
             </a:r>
             <a:r>
               <a:rPr lang="en-US" sz="600" dirty="0" smtClean="0">
                 <a:latin typeface="Consolas" pitchFamily="49" charset="0"/>
                 <a:cs typeface="Consolas" pitchFamily="49" charset="0"/>
               </a:rPr>
-              <a:t>base(</a:t>
+              <a:t>[1]) ||</a:t>
+            </a:r>
+          </a:p>
+          <a:p>
+            <a:r>
+              <a:rPr lang="en-US" sz="600" dirty="0">
+                <a:latin typeface="Consolas" pitchFamily="49" charset="0"/>
+                <a:cs typeface="Consolas" pitchFamily="49" charset="0"/>
+              </a:rPr>
+              <a:t> </a:t>
+            </a:r>
+            <a:r>
+              <a:rPr lang="en-US" sz="600" dirty="0" smtClean="0">
+                <a:latin typeface="Consolas" pitchFamily="49" charset="0"/>
+                <a:cs typeface="Consolas" pitchFamily="49" charset="0"/>
+              </a:rPr>
+              <a:t>       r1 + 12 &gt; bound(</a:t>
             </a:r>
             <a:r>
               <a:rPr lang="en-US" sz="600" dirty="0" err="1" smtClean="0">
@@ -6729,58 +9594,7 @@
                 <a:latin typeface="Consolas" pitchFamily="49" charset="0"/>
                 <a:cs typeface="Consolas" pitchFamily="49" charset="0"/>
               </a:rPr>
-              <a:t>[1</a:t>
-            </a:r>
-            <a:r>
-              <a:rPr lang="en-US" sz="600" dirty="0" smtClean="0">
-                <a:latin typeface="Consolas" pitchFamily="49" charset="0"/>
-                <a:cs typeface="Consolas" pitchFamily="49" charset="0"/>
-              </a:rPr>
-              <a:t>]) ||</a:t>
-            </a:r>
-          </a:p>
-          <a:p>
-            <a:r>
-              <a:rPr lang="en-US" sz="600" dirty="0">
-                <a:latin typeface="Consolas" pitchFamily="49" charset="0"/>
-                <a:cs typeface="Consolas" pitchFamily="49" charset="0"/>
-              </a:rPr>
-              <a:t> </a:t>
-            </a:r>
-            <a:r>
-              <a:rPr lang="en-US" sz="600" dirty="0" smtClean="0">
-                <a:latin typeface="Consolas" pitchFamily="49" charset="0"/>
-                <a:cs typeface="Consolas" pitchFamily="49" charset="0"/>
-              </a:rPr>
-              <a:t>       r1 + 12 &gt; </a:t>
-            </a:r>
-            <a:r>
-              <a:rPr lang="en-US" sz="600" dirty="0" smtClean="0">
-                <a:latin typeface="Consolas" pitchFamily="49" charset="0"/>
-                <a:cs typeface="Consolas" pitchFamily="49" charset="0"/>
-              </a:rPr>
-              <a:t>bound(</a:t>
-            </a:r>
-            <a:r>
-              <a:rPr lang="en-US" sz="600" dirty="0" err="1" smtClean="0">
-                <a:latin typeface="Consolas" pitchFamily="49" charset="0"/>
-                <a:cs typeface="Consolas" pitchFamily="49" charset="0"/>
-              </a:rPr>
-              <a:t>rf_metadata</a:t>
-            </a:r>
-            <a:r>
-              <a:rPr lang="en-US" sz="600" dirty="0" smtClean="0">
-                <a:latin typeface="Consolas" pitchFamily="49" charset="0"/>
-                <a:cs typeface="Consolas" pitchFamily="49" charset="0"/>
-              </a:rPr>
-              <a:t>[1</a:t>
-            </a:r>
-            <a:r>
-              <a:rPr lang="en-US" sz="600" dirty="0" smtClean="0">
-                <a:latin typeface="Consolas" pitchFamily="49" charset="0"/>
-                <a:cs typeface="Consolas" pitchFamily="49" charset="0"/>
-              </a:rPr>
-              <a:t>])) {</a:t>
+              <a:t>[1])) {</a:t>
             </a:r>
           </a:p>
           <a:p>
@@ -6850,14 +9664,37 @@
                 <a:latin typeface="Consolas" pitchFamily="49" charset="0"/>
                 <a:cs typeface="Consolas" pitchFamily="49" charset="0"/>
               </a:rPr>
-              <a:t>4: if (r2 + 12 &lt; </a:t>
+              <a:t>4: if (r2 + 12 &lt; base(</a:t>
+            </a:r>
+            <a:r>
+              <a:rPr lang="en-US" sz="600" dirty="0" err="1" smtClean="0">
+                <a:latin typeface="Consolas" pitchFamily="49" charset="0"/>
+                <a:cs typeface="Consolas" pitchFamily="49" charset="0"/>
+              </a:rPr>
+              <a:t>rf_metadata</a:t>
             </a:r>
             <a:r>
               <a:rPr lang="en-US" sz="600" dirty="0" smtClean="0">
                 <a:latin typeface="Consolas" pitchFamily="49" charset="0"/>
                 <a:cs typeface="Consolas" pitchFamily="49" charset="0"/>
               </a:rPr>
-              <a:t>base(</a:t>
+              <a:t>[2]) ||</a:t>
+            </a:r>
+          </a:p>
+          <a:p>
+            <a:r>
+              <a:rPr lang="en-US" sz="600" dirty="0">
+                <a:latin typeface="Consolas" pitchFamily="49" charset="0"/>
+                <a:cs typeface="Consolas" pitchFamily="49" charset="0"/>
+              </a:rPr>
+              <a:t> </a:t>
+            </a:r>
+            <a:r>
+              <a:rPr lang="en-US" sz="600" dirty="0" smtClean="0">
+                <a:latin typeface="Consolas" pitchFamily="49" charset="0"/>
+                <a:cs typeface="Consolas" pitchFamily="49" charset="0"/>
+              </a:rPr>
+              <a:t>      r2 + 12 &gt; bound(</a:t>
             </a:r>
             <a:r>
               <a:rPr lang="en-US" sz="600" dirty="0" err="1" smtClean="0">
@@ -6871,58 +9708,7 @@
                 <a:latin typeface="Consolas" pitchFamily="49" charset="0"/>
                 <a:cs typeface="Consolas" pitchFamily="49" charset="0"/>
               </a:rPr>
-              <a:t>[2</a:t>
-            </a:r>
-            <a:r>
-              <a:rPr lang="en-US" sz="600" dirty="0" smtClean="0">
-                <a:latin typeface="Consolas" pitchFamily="49" charset="0"/>
-                <a:cs typeface="Consolas" pitchFamily="49" charset="0"/>
-              </a:rPr>
-              <a:t>]) ||</a:t>
-            </a:r>
-          </a:p>
-          <a:p>
-            <a:r>
-              <a:rPr lang="en-US" sz="600" dirty="0">
-                <a:latin typeface="Consolas" pitchFamily="49" charset="0"/>
-                <a:cs typeface="Consolas" pitchFamily="49" charset="0"/>
-              </a:rPr>
-              <a:t> </a:t>
-            </a:r>
-            <a:r>
-              <a:rPr lang="en-US" sz="600" dirty="0" smtClean="0">
-                <a:latin typeface="Consolas" pitchFamily="49" charset="0"/>
-                <a:cs typeface="Consolas" pitchFamily="49" charset="0"/>
-              </a:rPr>
-              <a:t>      r2 + 12 &gt; </a:t>
-            </a:r>
-            <a:r>
-              <a:rPr lang="en-US" sz="600" dirty="0" smtClean="0">
-                <a:latin typeface="Consolas" pitchFamily="49" charset="0"/>
-                <a:cs typeface="Consolas" pitchFamily="49" charset="0"/>
-              </a:rPr>
-              <a:t>bound(</a:t>
-            </a:r>
-            <a:r>
-              <a:rPr lang="en-US" sz="600" dirty="0" err="1" smtClean="0">
-                <a:latin typeface="Consolas" pitchFamily="49" charset="0"/>
-                <a:cs typeface="Consolas" pitchFamily="49" charset="0"/>
-              </a:rPr>
-              <a:t>rf_metadata</a:t>
-            </a:r>
-            <a:r>
-              <a:rPr lang="en-US" sz="600" dirty="0" smtClean="0">
-                <a:latin typeface="Consolas" pitchFamily="49" charset="0"/>
-                <a:cs typeface="Consolas" pitchFamily="49" charset="0"/>
-              </a:rPr>
-              <a:t>[2</a:t>
-            </a:r>
-            <a:r>
-              <a:rPr lang="en-US" sz="600" dirty="0" smtClean="0">
-                <a:latin typeface="Consolas" pitchFamily="49" charset="0"/>
-                <a:cs typeface="Consolas" pitchFamily="49" charset="0"/>
-              </a:rPr>
-              <a:t>])) {</a:t>
+              <a:t>[2])) {</a:t>
             </a:r>
           </a:p>
           <a:p>
@@ -7390,7 +10176,7 @@
 </p:sld>
 </file>
 
-<file path=ppt/slides/slide3.xml><?xml version="1.0" encoding="utf-8"?>
+<file path=ppt/slides/slide4.xml><?xml version="1.0" encoding="utf-8"?>
 <p:sld xmlns:a="http://schemas.openxmlformats.org/drawingml/2006/main" xmlns:r="http://schemas.openxmlformats.org/officeDocument/2006/relationships" xmlns:p="http://schemas.openxmlformats.org/presentationml/2006/main">
   <p:cSld>
     <p:spTree>

</xml_diff>